<commit_message>
Finished demo 3 presentation
</commit_message>
<xml_diff>
--- a/Documentation/Demo 3/Demo3 Presentation.pptx
+++ b/Documentation/Demo 3/Demo3 Presentation.pptx
@@ -14,10 +14,8 @@
     <p:sldId id="260" r:id="rId8"/>
     <p:sldId id="261" r:id="rId9"/>
     <p:sldId id="262" r:id="rId10"/>
-    <p:sldId id="269" r:id="rId11"/>
-    <p:sldId id="263" r:id="rId12"/>
-    <p:sldId id="264" r:id="rId13"/>
-    <p:sldId id="266" r:id="rId14"/>
+    <p:sldId id="263" r:id="rId11"/>
+    <p:sldId id="266" r:id="rId12"/>
   </p:sldIdLst>
   <p:sldSz cx="12192000" cy="6858000"/>
   <p:notesSz cx="6858000" cy="9144000"/>
@@ -116,7 +114,2500 @@
       </a:defRPr>
     </a:lvl9pPr>
   </p:defaultTextStyle>
+  <p:extLst>
+    <p:ext uri="{EFAFB233-063F-42B5-8137-9DF3F51BA10A}">
+      <p15:sldGuideLst xmlns:p15="http://schemas.microsoft.com/office/powerpoint/2012/main"/>
+    </p:ext>
+  </p:extLst>
 </p:presentation>
+</file>
+
+<file path=ppt/diagrams/colors1.xml><?xml version="1.0" encoding="utf-8"?>
+<dgm:colorsDef xmlns:dgm="http://schemas.openxmlformats.org/drawingml/2006/diagram" xmlns:a="http://schemas.openxmlformats.org/drawingml/2006/main" uniqueId="urn:microsoft.com/office/officeart/2005/8/colors/accent1_2">
+  <dgm:title val=""/>
+  <dgm:desc val=""/>
+  <dgm:catLst>
+    <dgm:cat type="accent1" pri="11200"/>
+  </dgm:catLst>
+  <dgm:styleLbl name="node0">
+    <dgm:fillClrLst meth="repeat">
+      <a:schemeClr val="accent1"/>
+    </dgm:fillClrLst>
+    <dgm:linClrLst meth="repeat">
+      <a:schemeClr val="lt1"/>
+    </dgm:linClrLst>
+    <dgm:effectClrLst/>
+    <dgm:txLinClrLst/>
+    <dgm:txFillClrLst/>
+    <dgm:txEffectClrLst/>
+  </dgm:styleLbl>
+  <dgm:styleLbl name="alignNode1">
+    <dgm:fillClrLst meth="repeat">
+      <a:schemeClr val="accent1"/>
+    </dgm:fillClrLst>
+    <dgm:linClrLst meth="repeat">
+      <a:schemeClr val="accent1"/>
+    </dgm:linClrLst>
+    <dgm:effectClrLst/>
+    <dgm:txLinClrLst/>
+    <dgm:txFillClrLst/>
+    <dgm:txEffectClrLst/>
+  </dgm:styleLbl>
+  <dgm:styleLbl name="node1">
+    <dgm:fillClrLst meth="repeat">
+      <a:schemeClr val="accent1"/>
+    </dgm:fillClrLst>
+    <dgm:linClrLst meth="repeat">
+      <a:schemeClr val="lt1"/>
+    </dgm:linClrLst>
+    <dgm:effectClrLst/>
+    <dgm:txLinClrLst/>
+    <dgm:txFillClrLst/>
+    <dgm:txEffectClrLst/>
+  </dgm:styleLbl>
+  <dgm:styleLbl name="lnNode1">
+    <dgm:fillClrLst meth="repeat">
+      <a:schemeClr val="accent1"/>
+    </dgm:fillClrLst>
+    <dgm:linClrLst meth="repeat">
+      <a:schemeClr val="lt1"/>
+    </dgm:linClrLst>
+    <dgm:effectClrLst/>
+    <dgm:txLinClrLst/>
+    <dgm:txFillClrLst/>
+    <dgm:txEffectClrLst/>
+  </dgm:styleLbl>
+  <dgm:styleLbl name="vennNode1">
+    <dgm:fillClrLst meth="repeat">
+      <a:schemeClr val="accent1">
+        <a:alpha val="50000"/>
+      </a:schemeClr>
+    </dgm:fillClrLst>
+    <dgm:linClrLst meth="repeat">
+      <a:schemeClr val="lt1"/>
+    </dgm:linClrLst>
+    <dgm:effectClrLst/>
+    <dgm:txLinClrLst/>
+    <dgm:txFillClrLst/>
+    <dgm:txEffectClrLst/>
+  </dgm:styleLbl>
+  <dgm:styleLbl name="node2">
+    <dgm:fillClrLst meth="repeat">
+      <a:schemeClr val="accent1"/>
+    </dgm:fillClrLst>
+    <dgm:linClrLst meth="repeat">
+      <a:schemeClr val="lt1"/>
+    </dgm:linClrLst>
+    <dgm:effectClrLst/>
+    <dgm:txLinClrLst/>
+    <dgm:txFillClrLst/>
+    <dgm:txEffectClrLst/>
+  </dgm:styleLbl>
+  <dgm:styleLbl name="node3">
+    <dgm:fillClrLst meth="repeat">
+      <a:schemeClr val="accent1"/>
+    </dgm:fillClrLst>
+    <dgm:linClrLst meth="repeat">
+      <a:schemeClr val="lt1"/>
+    </dgm:linClrLst>
+    <dgm:effectClrLst/>
+    <dgm:txLinClrLst/>
+    <dgm:txFillClrLst/>
+    <dgm:txEffectClrLst/>
+  </dgm:styleLbl>
+  <dgm:styleLbl name="node4">
+    <dgm:fillClrLst meth="repeat">
+      <a:schemeClr val="accent1"/>
+    </dgm:fillClrLst>
+    <dgm:linClrLst meth="repeat">
+      <a:schemeClr val="lt1"/>
+    </dgm:linClrLst>
+    <dgm:effectClrLst/>
+    <dgm:txLinClrLst/>
+    <dgm:txFillClrLst/>
+    <dgm:txEffectClrLst/>
+  </dgm:styleLbl>
+  <dgm:styleLbl name="fgImgPlace1">
+    <dgm:fillClrLst meth="repeat">
+      <a:schemeClr val="accent1">
+        <a:tint val="50000"/>
+      </a:schemeClr>
+    </dgm:fillClrLst>
+    <dgm:linClrLst meth="repeat">
+      <a:schemeClr val="lt1"/>
+    </dgm:linClrLst>
+    <dgm:effectClrLst/>
+    <dgm:txLinClrLst/>
+    <dgm:txFillClrLst meth="repeat">
+      <a:schemeClr val="lt1"/>
+    </dgm:txFillClrLst>
+    <dgm:txEffectClrLst/>
+  </dgm:styleLbl>
+  <dgm:styleLbl name="alignImgPlace1">
+    <dgm:fillClrLst meth="repeat">
+      <a:schemeClr val="accent1">
+        <a:tint val="50000"/>
+      </a:schemeClr>
+    </dgm:fillClrLst>
+    <dgm:linClrLst meth="repeat">
+      <a:schemeClr val="lt1"/>
+    </dgm:linClrLst>
+    <dgm:effectClrLst/>
+    <dgm:txLinClrLst/>
+    <dgm:txFillClrLst meth="repeat">
+      <a:schemeClr val="lt1"/>
+    </dgm:txFillClrLst>
+    <dgm:txEffectClrLst/>
+  </dgm:styleLbl>
+  <dgm:styleLbl name="bgImgPlace1">
+    <dgm:fillClrLst meth="repeat">
+      <a:schemeClr val="accent1">
+        <a:tint val="50000"/>
+      </a:schemeClr>
+    </dgm:fillClrLst>
+    <dgm:linClrLst meth="repeat">
+      <a:schemeClr val="lt1"/>
+    </dgm:linClrLst>
+    <dgm:effectClrLst/>
+    <dgm:txLinClrLst/>
+    <dgm:txFillClrLst meth="repeat">
+      <a:schemeClr val="lt1"/>
+    </dgm:txFillClrLst>
+    <dgm:txEffectClrLst/>
+  </dgm:styleLbl>
+  <dgm:styleLbl name="sibTrans2D1">
+    <dgm:fillClrLst meth="repeat">
+      <a:schemeClr val="accent1">
+        <a:tint val="60000"/>
+      </a:schemeClr>
+    </dgm:fillClrLst>
+    <dgm:linClrLst meth="repeat">
+      <a:schemeClr val="accent1">
+        <a:tint val="60000"/>
+      </a:schemeClr>
+    </dgm:linClrLst>
+    <dgm:effectClrLst/>
+    <dgm:txLinClrLst/>
+    <dgm:txFillClrLst/>
+    <dgm:txEffectClrLst/>
+  </dgm:styleLbl>
+  <dgm:styleLbl name="fgSibTrans2D1">
+    <dgm:fillClrLst meth="repeat">
+      <a:schemeClr val="accent1">
+        <a:tint val="60000"/>
+      </a:schemeClr>
+    </dgm:fillClrLst>
+    <dgm:linClrLst meth="repeat">
+      <a:schemeClr val="accent1">
+        <a:tint val="60000"/>
+      </a:schemeClr>
+    </dgm:linClrLst>
+    <dgm:effectClrLst/>
+    <dgm:txLinClrLst/>
+    <dgm:txFillClrLst/>
+    <dgm:txEffectClrLst/>
+  </dgm:styleLbl>
+  <dgm:styleLbl name="bgSibTrans2D1">
+    <dgm:fillClrLst meth="repeat">
+      <a:schemeClr val="accent1">
+        <a:tint val="60000"/>
+      </a:schemeClr>
+    </dgm:fillClrLst>
+    <dgm:linClrLst meth="repeat">
+      <a:schemeClr val="accent1">
+        <a:tint val="60000"/>
+      </a:schemeClr>
+    </dgm:linClrLst>
+    <dgm:effectClrLst/>
+    <dgm:txLinClrLst/>
+    <dgm:txFillClrLst/>
+    <dgm:txEffectClrLst/>
+  </dgm:styleLbl>
+  <dgm:styleLbl name="sibTrans1D1">
+    <dgm:fillClrLst meth="repeat">
+      <a:schemeClr val="accent1"/>
+    </dgm:fillClrLst>
+    <dgm:linClrLst meth="repeat">
+      <a:schemeClr val="accent1"/>
+    </dgm:linClrLst>
+    <dgm:effectClrLst/>
+    <dgm:txLinClrLst/>
+    <dgm:txFillClrLst meth="repeat">
+      <a:schemeClr val="tx1"/>
+    </dgm:txFillClrLst>
+    <dgm:txEffectClrLst/>
+  </dgm:styleLbl>
+  <dgm:styleLbl name="callout">
+    <dgm:fillClrLst meth="repeat">
+      <a:schemeClr val="accent1"/>
+    </dgm:fillClrLst>
+    <dgm:linClrLst meth="repeat">
+      <a:schemeClr val="accent1">
+        <a:tint val="50000"/>
+      </a:schemeClr>
+    </dgm:linClrLst>
+    <dgm:effectClrLst/>
+    <dgm:txLinClrLst/>
+    <dgm:txFillClrLst meth="repeat">
+      <a:schemeClr val="tx1"/>
+    </dgm:txFillClrLst>
+    <dgm:txEffectClrLst/>
+  </dgm:styleLbl>
+  <dgm:styleLbl name="asst0">
+    <dgm:fillClrLst meth="repeat">
+      <a:schemeClr val="accent1"/>
+    </dgm:fillClrLst>
+    <dgm:linClrLst meth="repeat">
+      <a:schemeClr val="lt1"/>
+    </dgm:linClrLst>
+    <dgm:effectClrLst/>
+    <dgm:txLinClrLst/>
+    <dgm:txFillClrLst/>
+    <dgm:txEffectClrLst/>
+  </dgm:styleLbl>
+  <dgm:styleLbl name="asst1">
+    <dgm:fillClrLst meth="repeat">
+      <a:schemeClr val="accent1"/>
+    </dgm:fillClrLst>
+    <dgm:linClrLst meth="repeat">
+      <a:schemeClr val="lt1"/>
+    </dgm:linClrLst>
+    <dgm:effectClrLst/>
+    <dgm:txLinClrLst/>
+    <dgm:txFillClrLst/>
+    <dgm:txEffectClrLst/>
+  </dgm:styleLbl>
+  <dgm:styleLbl name="asst2">
+    <dgm:fillClrLst meth="repeat">
+      <a:schemeClr val="accent1"/>
+    </dgm:fillClrLst>
+    <dgm:linClrLst meth="repeat">
+      <a:schemeClr val="lt1"/>
+    </dgm:linClrLst>
+    <dgm:effectClrLst/>
+    <dgm:txLinClrLst/>
+    <dgm:txFillClrLst/>
+    <dgm:txEffectClrLst/>
+  </dgm:styleLbl>
+  <dgm:styleLbl name="asst3">
+    <dgm:fillClrLst meth="repeat">
+      <a:schemeClr val="accent1"/>
+    </dgm:fillClrLst>
+    <dgm:linClrLst meth="repeat">
+      <a:schemeClr val="lt1"/>
+    </dgm:linClrLst>
+    <dgm:effectClrLst/>
+    <dgm:txLinClrLst/>
+    <dgm:txFillClrLst/>
+    <dgm:txEffectClrLst/>
+  </dgm:styleLbl>
+  <dgm:styleLbl name="asst4">
+    <dgm:fillClrLst meth="repeat">
+      <a:schemeClr val="accent1"/>
+    </dgm:fillClrLst>
+    <dgm:linClrLst meth="repeat">
+      <a:schemeClr val="lt1"/>
+    </dgm:linClrLst>
+    <dgm:effectClrLst/>
+    <dgm:txLinClrLst/>
+    <dgm:txFillClrLst/>
+    <dgm:txEffectClrLst/>
+  </dgm:styleLbl>
+  <dgm:styleLbl name="parChTrans2D1">
+    <dgm:fillClrLst meth="repeat">
+      <a:schemeClr val="accent1">
+        <a:tint val="60000"/>
+      </a:schemeClr>
+    </dgm:fillClrLst>
+    <dgm:linClrLst meth="repeat">
+      <a:schemeClr val="accent1">
+        <a:tint val="60000"/>
+      </a:schemeClr>
+    </dgm:linClrLst>
+    <dgm:effectClrLst/>
+    <dgm:txLinClrLst/>
+    <dgm:txFillClrLst meth="repeat">
+      <a:schemeClr val="lt1"/>
+    </dgm:txFillClrLst>
+    <dgm:txEffectClrLst/>
+  </dgm:styleLbl>
+  <dgm:styleLbl name="parChTrans2D2">
+    <dgm:fillClrLst meth="repeat">
+      <a:schemeClr val="accent1"/>
+    </dgm:fillClrLst>
+    <dgm:linClrLst meth="repeat">
+      <a:schemeClr val="accent1"/>
+    </dgm:linClrLst>
+    <dgm:effectClrLst/>
+    <dgm:txLinClrLst/>
+    <dgm:txFillClrLst meth="repeat">
+      <a:schemeClr val="lt1"/>
+    </dgm:txFillClrLst>
+    <dgm:txEffectClrLst/>
+  </dgm:styleLbl>
+  <dgm:styleLbl name="parChTrans2D3">
+    <dgm:fillClrLst meth="repeat">
+      <a:schemeClr val="accent1"/>
+    </dgm:fillClrLst>
+    <dgm:linClrLst meth="repeat">
+      <a:schemeClr val="accent1"/>
+    </dgm:linClrLst>
+    <dgm:effectClrLst/>
+    <dgm:txLinClrLst/>
+    <dgm:txFillClrLst meth="repeat">
+      <a:schemeClr val="lt1"/>
+    </dgm:txFillClrLst>
+    <dgm:txEffectClrLst/>
+  </dgm:styleLbl>
+  <dgm:styleLbl name="parChTrans2D4">
+    <dgm:fillClrLst meth="repeat">
+      <a:schemeClr val="accent1"/>
+    </dgm:fillClrLst>
+    <dgm:linClrLst meth="repeat">
+      <a:schemeClr val="accent1"/>
+    </dgm:linClrLst>
+    <dgm:effectClrLst/>
+    <dgm:txLinClrLst/>
+    <dgm:txFillClrLst meth="repeat">
+      <a:schemeClr val="lt1"/>
+    </dgm:txFillClrLst>
+    <dgm:txEffectClrLst/>
+  </dgm:styleLbl>
+  <dgm:styleLbl name="parChTrans1D1">
+    <dgm:fillClrLst meth="repeat">
+      <a:schemeClr val="accent1"/>
+    </dgm:fillClrLst>
+    <dgm:linClrLst meth="repeat">
+      <a:schemeClr val="accent1">
+        <a:shade val="60000"/>
+      </a:schemeClr>
+    </dgm:linClrLst>
+    <dgm:effectClrLst/>
+    <dgm:txLinClrLst/>
+    <dgm:txFillClrLst meth="repeat">
+      <a:schemeClr val="tx1"/>
+    </dgm:txFillClrLst>
+    <dgm:txEffectClrLst/>
+  </dgm:styleLbl>
+  <dgm:styleLbl name="parChTrans1D2">
+    <dgm:fillClrLst meth="repeat">
+      <a:schemeClr val="accent1"/>
+    </dgm:fillClrLst>
+    <dgm:linClrLst meth="repeat">
+      <a:schemeClr val="accent1">
+        <a:shade val="60000"/>
+      </a:schemeClr>
+    </dgm:linClrLst>
+    <dgm:effectClrLst/>
+    <dgm:txLinClrLst/>
+    <dgm:txFillClrLst meth="repeat">
+      <a:schemeClr val="tx1"/>
+    </dgm:txFillClrLst>
+    <dgm:txEffectClrLst/>
+  </dgm:styleLbl>
+  <dgm:styleLbl name="parChTrans1D3">
+    <dgm:fillClrLst meth="repeat">
+      <a:schemeClr val="accent1"/>
+    </dgm:fillClrLst>
+    <dgm:linClrLst meth="repeat">
+      <a:schemeClr val="accent1">
+        <a:shade val="80000"/>
+      </a:schemeClr>
+    </dgm:linClrLst>
+    <dgm:effectClrLst/>
+    <dgm:txLinClrLst/>
+    <dgm:txFillClrLst meth="repeat">
+      <a:schemeClr val="tx1"/>
+    </dgm:txFillClrLst>
+    <dgm:txEffectClrLst/>
+  </dgm:styleLbl>
+  <dgm:styleLbl name="parChTrans1D4">
+    <dgm:fillClrLst meth="repeat">
+      <a:schemeClr val="accent1"/>
+    </dgm:fillClrLst>
+    <dgm:linClrLst meth="repeat">
+      <a:schemeClr val="accent1">
+        <a:shade val="80000"/>
+      </a:schemeClr>
+    </dgm:linClrLst>
+    <dgm:effectClrLst/>
+    <dgm:txLinClrLst/>
+    <dgm:txFillClrLst meth="repeat">
+      <a:schemeClr val="tx1"/>
+    </dgm:txFillClrLst>
+    <dgm:txEffectClrLst/>
+  </dgm:styleLbl>
+  <dgm:styleLbl name="fgAcc1">
+    <dgm:fillClrLst meth="repeat">
+      <a:schemeClr val="lt1">
+        <a:alpha val="90000"/>
+      </a:schemeClr>
+    </dgm:fillClrLst>
+    <dgm:linClrLst meth="repeat">
+      <a:schemeClr val="accent1"/>
+    </dgm:linClrLst>
+    <dgm:effectClrLst/>
+    <dgm:txLinClrLst/>
+    <dgm:txFillClrLst meth="repeat">
+      <a:schemeClr val="dk1"/>
+    </dgm:txFillClrLst>
+    <dgm:txEffectClrLst/>
+  </dgm:styleLbl>
+  <dgm:styleLbl name="conFgAcc1">
+    <dgm:fillClrLst meth="repeat">
+      <a:schemeClr val="lt1">
+        <a:alpha val="90000"/>
+      </a:schemeClr>
+    </dgm:fillClrLst>
+    <dgm:linClrLst meth="repeat">
+      <a:schemeClr val="accent1"/>
+    </dgm:linClrLst>
+    <dgm:effectClrLst/>
+    <dgm:txLinClrLst/>
+    <dgm:txFillClrLst meth="repeat">
+      <a:schemeClr val="dk1"/>
+    </dgm:txFillClrLst>
+    <dgm:txEffectClrLst/>
+  </dgm:styleLbl>
+  <dgm:styleLbl name="alignAcc1">
+    <dgm:fillClrLst meth="repeat">
+      <a:schemeClr val="lt1">
+        <a:alpha val="90000"/>
+      </a:schemeClr>
+    </dgm:fillClrLst>
+    <dgm:linClrLst meth="repeat">
+      <a:schemeClr val="accent1"/>
+    </dgm:linClrLst>
+    <dgm:effectClrLst/>
+    <dgm:txLinClrLst/>
+    <dgm:txFillClrLst meth="repeat">
+      <a:schemeClr val="dk1"/>
+    </dgm:txFillClrLst>
+    <dgm:txEffectClrLst/>
+  </dgm:styleLbl>
+  <dgm:styleLbl name="trAlignAcc1">
+    <dgm:fillClrLst meth="repeat">
+      <a:schemeClr val="lt1">
+        <a:alpha val="40000"/>
+      </a:schemeClr>
+    </dgm:fillClrLst>
+    <dgm:linClrLst meth="repeat">
+      <a:schemeClr val="accent1"/>
+    </dgm:linClrLst>
+    <dgm:effectClrLst/>
+    <dgm:txLinClrLst/>
+    <dgm:txFillClrLst meth="repeat">
+      <a:schemeClr val="dk1"/>
+    </dgm:txFillClrLst>
+    <dgm:txEffectClrLst/>
+  </dgm:styleLbl>
+  <dgm:styleLbl name="bgAcc1">
+    <dgm:fillClrLst meth="repeat">
+      <a:schemeClr val="lt1">
+        <a:alpha val="90000"/>
+      </a:schemeClr>
+    </dgm:fillClrLst>
+    <dgm:linClrLst meth="repeat">
+      <a:schemeClr val="accent1"/>
+    </dgm:linClrLst>
+    <dgm:effectClrLst/>
+    <dgm:txLinClrLst/>
+    <dgm:txFillClrLst meth="repeat">
+      <a:schemeClr val="dk1"/>
+    </dgm:txFillClrLst>
+    <dgm:txEffectClrLst/>
+  </dgm:styleLbl>
+  <dgm:styleLbl name="solidFgAcc1">
+    <dgm:fillClrLst meth="repeat">
+      <a:schemeClr val="lt1"/>
+    </dgm:fillClrLst>
+    <dgm:linClrLst meth="repeat">
+      <a:schemeClr val="accent1"/>
+    </dgm:linClrLst>
+    <dgm:effectClrLst/>
+    <dgm:txLinClrLst/>
+    <dgm:txFillClrLst meth="repeat">
+      <a:schemeClr val="dk1"/>
+    </dgm:txFillClrLst>
+    <dgm:txEffectClrLst/>
+  </dgm:styleLbl>
+  <dgm:styleLbl name="solidAlignAcc1">
+    <dgm:fillClrLst meth="repeat">
+      <a:schemeClr val="lt1"/>
+    </dgm:fillClrLst>
+    <dgm:linClrLst meth="repeat">
+      <a:schemeClr val="accent1"/>
+    </dgm:linClrLst>
+    <dgm:effectClrLst/>
+    <dgm:txLinClrLst/>
+    <dgm:txFillClrLst meth="repeat">
+      <a:schemeClr val="dk1"/>
+    </dgm:txFillClrLst>
+    <dgm:txEffectClrLst/>
+  </dgm:styleLbl>
+  <dgm:styleLbl name="solidBgAcc1">
+    <dgm:fillClrLst meth="repeat">
+      <a:schemeClr val="lt1"/>
+    </dgm:fillClrLst>
+    <dgm:linClrLst meth="repeat">
+      <a:schemeClr val="accent1"/>
+    </dgm:linClrLst>
+    <dgm:effectClrLst/>
+    <dgm:txLinClrLst/>
+    <dgm:txFillClrLst meth="repeat">
+      <a:schemeClr val="dk1"/>
+    </dgm:txFillClrLst>
+    <dgm:txEffectClrLst/>
+  </dgm:styleLbl>
+  <dgm:styleLbl name="fgAccFollowNode1">
+    <dgm:fillClrLst meth="repeat">
+      <a:schemeClr val="accent1">
+        <a:alpha val="90000"/>
+        <a:tint val="40000"/>
+      </a:schemeClr>
+    </dgm:fillClrLst>
+    <dgm:linClrLst meth="repeat">
+      <a:schemeClr val="accent1">
+        <a:alpha val="90000"/>
+        <a:tint val="40000"/>
+      </a:schemeClr>
+    </dgm:linClrLst>
+    <dgm:effectClrLst/>
+    <dgm:txLinClrLst/>
+    <dgm:txFillClrLst meth="repeat">
+      <a:schemeClr val="dk1"/>
+    </dgm:txFillClrLst>
+    <dgm:txEffectClrLst/>
+  </dgm:styleLbl>
+  <dgm:styleLbl name="alignAccFollowNode1">
+    <dgm:fillClrLst meth="repeat">
+      <a:schemeClr val="accent1">
+        <a:alpha val="90000"/>
+        <a:tint val="40000"/>
+      </a:schemeClr>
+    </dgm:fillClrLst>
+    <dgm:linClrLst meth="repeat">
+      <a:schemeClr val="accent1">
+        <a:alpha val="90000"/>
+        <a:tint val="40000"/>
+      </a:schemeClr>
+    </dgm:linClrLst>
+    <dgm:effectClrLst/>
+    <dgm:txLinClrLst/>
+    <dgm:txFillClrLst meth="repeat">
+      <a:schemeClr val="dk1"/>
+    </dgm:txFillClrLst>
+    <dgm:txEffectClrLst/>
+  </dgm:styleLbl>
+  <dgm:styleLbl name="bgAccFollowNode1">
+    <dgm:fillClrLst meth="repeat">
+      <a:schemeClr val="accent1">
+        <a:alpha val="90000"/>
+        <a:tint val="40000"/>
+      </a:schemeClr>
+    </dgm:fillClrLst>
+    <dgm:linClrLst meth="repeat">
+      <a:schemeClr val="accent1">
+        <a:alpha val="90000"/>
+        <a:tint val="40000"/>
+      </a:schemeClr>
+    </dgm:linClrLst>
+    <dgm:effectClrLst/>
+    <dgm:txLinClrLst/>
+    <dgm:txFillClrLst meth="repeat">
+      <a:schemeClr val="dk1"/>
+    </dgm:txFillClrLst>
+    <dgm:txEffectClrLst/>
+  </dgm:styleLbl>
+  <dgm:styleLbl name="fgAcc0">
+    <dgm:fillClrLst meth="repeat">
+      <a:schemeClr val="lt1">
+        <a:alpha val="90000"/>
+      </a:schemeClr>
+    </dgm:fillClrLst>
+    <dgm:linClrLst meth="repeat">
+      <a:schemeClr val="accent1"/>
+    </dgm:linClrLst>
+    <dgm:effectClrLst/>
+    <dgm:txLinClrLst/>
+    <dgm:txFillClrLst meth="repeat">
+      <a:schemeClr val="dk1"/>
+    </dgm:txFillClrLst>
+    <dgm:txEffectClrLst/>
+  </dgm:styleLbl>
+  <dgm:styleLbl name="fgAcc2">
+    <dgm:fillClrLst meth="repeat">
+      <a:schemeClr val="lt1">
+        <a:alpha val="90000"/>
+      </a:schemeClr>
+    </dgm:fillClrLst>
+    <dgm:linClrLst meth="repeat">
+      <a:schemeClr val="accent1"/>
+    </dgm:linClrLst>
+    <dgm:effectClrLst/>
+    <dgm:txLinClrLst/>
+    <dgm:txFillClrLst meth="repeat">
+      <a:schemeClr val="dk1"/>
+    </dgm:txFillClrLst>
+    <dgm:txEffectClrLst/>
+  </dgm:styleLbl>
+  <dgm:styleLbl name="fgAcc3">
+    <dgm:fillClrLst meth="repeat">
+      <a:schemeClr val="lt1">
+        <a:alpha val="90000"/>
+      </a:schemeClr>
+    </dgm:fillClrLst>
+    <dgm:linClrLst meth="repeat">
+      <a:schemeClr val="accent1"/>
+    </dgm:linClrLst>
+    <dgm:effectClrLst/>
+    <dgm:txLinClrLst/>
+    <dgm:txFillClrLst meth="repeat">
+      <a:schemeClr val="dk1"/>
+    </dgm:txFillClrLst>
+    <dgm:txEffectClrLst/>
+  </dgm:styleLbl>
+  <dgm:styleLbl name="fgAcc4">
+    <dgm:fillClrLst meth="repeat">
+      <a:schemeClr val="lt1">
+        <a:alpha val="90000"/>
+      </a:schemeClr>
+    </dgm:fillClrLst>
+    <dgm:linClrLst meth="repeat">
+      <a:schemeClr val="accent1"/>
+    </dgm:linClrLst>
+    <dgm:effectClrLst/>
+    <dgm:txLinClrLst/>
+    <dgm:txFillClrLst meth="repeat">
+      <a:schemeClr val="dk1"/>
+    </dgm:txFillClrLst>
+    <dgm:txEffectClrLst/>
+  </dgm:styleLbl>
+  <dgm:styleLbl name="bgShp">
+    <dgm:fillClrLst meth="repeat">
+      <a:schemeClr val="accent1">
+        <a:tint val="40000"/>
+      </a:schemeClr>
+    </dgm:fillClrLst>
+    <dgm:linClrLst meth="repeat">
+      <a:schemeClr val="accent1"/>
+    </dgm:linClrLst>
+    <dgm:effectClrLst/>
+    <dgm:txLinClrLst/>
+    <dgm:txFillClrLst meth="repeat">
+      <a:schemeClr val="dk1"/>
+    </dgm:txFillClrLst>
+    <dgm:txEffectClrLst/>
+  </dgm:styleLbl>
+  <dgm:styleLbl name="dkBgShp">
+    <dgm:fillClrLst meth="repeat">
+      <a:schemeClr val="accent1">
+        <a:shade val="80000"/>
+      </a:schemeClr>
+    </dgm:fillClrLst>
+    <dgm:linClrLst meth="repeat">
+      <a:schemeClr val="accent1"/>
+    </dgm:linClrLst>
+    <dgm:effectClrLst/>
+    <dgm:txLinClrLst/>
+    <dgm:txFillClrLst meth="repeat">
+      <a:schemeClr val="lt1"/>
+    </dgm:txFillClrLst>
+    <dgm:txEffectClrLst/>
+  </dgm:styleLbl>
+  <dgm:styleLbl name="trBgShp">
+    <dgm:fillClrLst meth="repeat">
+      <a:schemeClr val="accent1">
+        <a:tint val="50000"/>
+        <a:alpha val="40000"/>
+      </a:schemeClr>
+    </dgm:fillClrLst>
+    <dgm:linClrLst meth="repeat">
+      <a:schemeClr val="accent1"/>
+    </dgm:linClrLst>
+    <dgm:effectClrLst/>
+    <dgm:txLinClrLst/>
+    <dgm:txFillClrLst meth="repeat">
+      <a:schemeClr val="lt1"/>
+    </dgm:txFillClrLst>
+    <dgm:txEffectClrLst/>
+  </dgm:styleLbl>
+  <dgm:styleLbl name="fgShp">
+    <dgm:fillClrLst meth="repeat">
+      <a:schemeClr val="accent1">
+        <a:tint val="60000"/>
+      </a:schemeClr>
+    </dgm:fillClrLst>
+    <dgm:linClrLst meth="repeat">
+      <a:schemeClr val="lt1"/>
+    </dgm:linClrLst>
+    <dgm:effectClrLst/>
+    <dgm:txLinClrLst/>
+    <dgm:txFillClrLst meth="repeat">
+      <a:schemeClr val="dk1"/>
+    </dgm:txFillClrLst>
+    <dgm:txEffectClrLst/>
+  </dgm:styleLbl>
+  <dgm:styleLbl name="revTx">
+    <dgm:fillClrLst meth="repeat">
+      <a:schemeClr val="lt1">
+        <a:alpha val="0"/>
+      </a:schemeClr>
+    </dgm:fillClrLst>
+    <dgm:linClrLst meth="repeat">
+      <a:schemeClr val="dk1">
+        <a:alpha val="0"/>
+      </a:schemeClr>
+    </dgm:linClrLst>
+    <dgm:effectClrLst/>
+    <dgm:txLinClrLst/>
+    <dgm:txFillClrLst meth="repeat">
+      <a:schemeClr val="tx1"/>
+    </dgm:txFillClrLst>
+    <dgm:txEffectClrLst/>
+  </dgm:styleLbl>
+</dgm:colorsDef>
+</file>
+
+<file path=ppt/diagrams/data1.xml><?xml version="1.0" encoding="utf-8"?>
+<dgm:dataModel xmlns:dgm="http://schemas.openxmlformats.org/drawingml/2006/diagram" xmlns:a="http://schemas.openxmlformats.org/drawingml/2006/main">
+  <dgm:ptLst>
+    <dgm:pt modelId="{63ACD774-593D-46A7-9541-6578062D6675}" type="doc">
+      <dgm:prSet loTypeId="urn:microsoft.com/office/officeart/2005/8/layout/default" loCatId="list" qsTypeId="urn:microsoft.com/office/officeart/2005/8/quickstyle/simple1" qsCatId="simple" csTypeId="urn:microsoft.com/office/officeart/2005/8/colors/accent1_2" csCatId="accent1" phldr="1"/>
+      <dgm:spPr/>
+      <dgm:t>
+        <a:bodyPr/>
+        <a:lstStyle/>
+        <a:p>
+          <a:endParaRPr lang="en-ZA"/>
+        </a:p>
+      </dgm:t>
+    </dgm:pt>
+    <dgm:pt modelId="{ADEA78F0-8DDD-4FE6-8117-388B8E6EC488}">
+      <dgm:prSet phldrT="[Text]"/>
+      <dgm:spPr/>
+      <dgm:t>
+        <a:bodyPr/>
+        <a:lstStyle/>
+        <a:p>
+          <a:r>
+            <a:rPr lang="en-ZA" dirty="0"/>
+            <a:t>Use Cases and Progress</a:t>
+          </a:r>
+        </a:p>
+      </dgm:t>
+    </dgm:pt>
+    <dgm:pt modelId="{8F2081CB-7D3C-46AC-BAB9-D3ADDEEC4CF8}" type="parTrans" cxnId="{79C090A9-BE46-422A-8E52-9C5156581EA6}">
+      <dgm:prSet/>
+      <dgm:spPr/>
+      <dgm:t>
+        <a:bodyPr/>
+        <a:lstStyle/>
+        <a:p>
+          <a:endParaRPr lang="en-ZA"/>
+        </a:p>
+      </dgm:t>
+    </dgm:pt>
+    <dgm:pt modelId="{5E3EBA97-F378-488D-AE92-064461EB1CA7}" type="sibTrans" cxnId="{79C090A9-BE46-422A-8E52-9C5156581EA6}">
+      <dgm:prSet/>
+      <dgm:spPr/>
+      <dgm:t>
+        <a:bodyPr/>
+        <a:lstStyle/>
+        <a:p>
+          <a:endParaRPr lang="en-ZA"/>
+        </a:p>
+      </dgm:t>
+    </dgm:pt>
+    <dgm:pt modelId="{1EB49671-9B60-4117-AA89-19942FE3FED8}">
+      <dgm:prSet phldrT="[Text]"/>
+      <dgm:spPr/>
+      <dgm:t>
+        <a:bodyPr/>
+        <a:lstStyle/>
+        <a:p>
+          <a:r>
+            <a:rPr lang="en-ZA" dirty="0"/>
+            <a:t>Unit and Integration Testing</a:t>
+          </a:r>
+        </a:p>
+      </dgm:t>
+    </dgm:pt>
+    <dgm:pt modelId="{8FE63FAF-AFAD-426B-92A8-FBC81507CA1A}" type="parTrans" cxnId="{867B2791-C94D-4171-8CD4-888956D0E437}">
+      <dgm:prSet/>
+      <dgm:spPr/>
+      <dgm:t>
+        <a:bodyPr/>
+        <a:lstStyle/>
+        <a:p>
+          <a:endParaRPr lang="en-ZA"/>
+        </a:p>
+      </dgm:t>
+    </dgm:pt>
+    <dgm:pt modelId="{BF0AE0DD-EE9F-45CD-986D-AA80E18204C0}" type="sibTrans" cxnId="{867B2791-C94D-4171-8CD4-888956D0E437}">
+      <dgm:prSet/>
+      <dgm:spPr/>
+      <dgm:t>
+        <a:bodyPr/>
+        <a:lstStyle/>
+        <a:p>
+          <a:endParaRPr lang="en-ZA"/>
+        </a:p>
+      </dgm:t>
+    </dgm:pt>
+    <dgm:pt modelId="{DE534155-B96B-4B5B-AFF3-0BE5F02EA329}">
+      <dgm:prSet phldrT="[Text]"/>
+      <dgm:spPr/>
+      <dgm:t>
+        <a:bodyPr/>
+        <a:lstStyle/>
+        <a:p>
+          <a:r>
+            <a:rPr lang="en-ZA" dirty="0"/>
+            <a:t>Admin Interface</a:t>
+          </a:r>
+        </a:p>
+      </dgm:t>
+    </dgm:pt>
+    <dgm:pt modelId="{F2BC1179-2BB6-44CC-A693-02D7BA07B090}" type="parTrans" cxnId="{3D417247-0274-46F1-A613-946C192E89D2}">
+      <dgm:prSet/>
+      <dgm:spPr/>
+      <dgm:t>
+        <a:bodyPr/>
+        <a:lstStyle/>
+        <a:p>
+          <a:endParaRPr lang="en-ZA"/>
+        </a:p>
+      </dgm:t>
+    </dgm:pt>
+    <dgm:pt modelId="{2783D0E8-7BD4-45AF-9EA5-8ED2813BD385}" type="sibTrans" cxnId="{3D417247-0274-46F1-A613-946C192E89D2}">
+      <dgm:prSet/>
+      <dgm:spPr/>
+      <dgm:t>
+        <a:bodyPr/>
+        <a:lstStyle/>
+        <a:p>
+          <a:endParaRPr lang="en-ZA"/>
+        </a:p>
+      </dgm:t>
+    </dgm:pt>
+    <dgm:pt modelId="{D60E27BA-3999-4A07-8D1C-1CFB84828071}">
+      <dgm:prSet phldrT="[Text]"/>
+      <dgm:spPr/>
+      <dgm:t>
+        <a:bodyPr/>
+        <a:lstStyle/>
+        <a:p>
+          <a:r>
+            <a:rPr lang="en-ZA" dirty="0"/>
+            <a:t>Mobile App</a:t>
+          </a:r>
+        </a:p>
+      </dgm:t>
+    </dgm:pt>
+    <dgm:pt modelId="{2A840C41-4757-42EA-84B4-38BF05EB2A22}" type="parTrans" cxnId="{CC4499E0-EE0D-44EB-A6DE-E7DE6974CF96}">
+      <dgm:prSet/>
+      <dgm:spPr/>
+      <dgm:t>
+        <a:bodyPr/>
+        <a:lstStyle/>
+        <a:p>
+          <a:endParaRPr lang="en-ZA"/>
+        </a:p>
+      </dgm:t>
+    </dgm:pt>
+    <dgm:pt modelId="{EF4C18CC-D7EA-4707-A5B1-A414E17BDD5B}" type="sibTrans" cxnId="{CC4499E0-EE0D-44EB-A6DE-E7DE6974CF96}">
+      <dgm:prSet/>
+      <dgm:spPr/>
+      <dgm:t>
+        <a:bodyPr/>
+        <a:lstStyle/>
+        <a:p>
+          <a:endParaRPr lang="en-ZA"/>
+        </a:p>
+      </dgm:t>
+    </dgm:pt>
+    <dgm:pt modelId="{AC0E12E3-7E90-4F5B-AFEE-1901A1908815}" type="pres">
+      <dgm:prSet presAssocID="{63ACD774-593D-46A7-9541-6578062D6675}" presName="diagram" presStyleCnt="0">
+        <dgm:presLayoutVars>
+          <dgm:dir/>
+          <dgm:resizeHandles val="exact"/>
+        </dgm:presLayoutVars>
+      </dgm:prSet>
+      <dgm:spPr/>
+    </dgm:pt>
+    <dgm:pt modelId="{D23976C9-AA96-4A8F-B851-75490045A07D}" type="pres">
+      <dgm:prSet presAssocID="{ADEA78F0-8DDD-4FE6-8117-388B8E6EC488}" presName="node" presStyleLbl="node1" presStyleIdx="0" presStyleCnt="4">
+        <dgm:presLayoutVars>
+          <dgm:bulletEnabled val="1"/>
+        </dgm:presLayoutVars>
+      </dgm:prSet>
+      <dgm:spPr/>
+    </dgm:pt>
+    <dgm:pt modelId="{EF7F0DF8-368B-43BB-A248-7C972D216B89}" type="pres">
+      <dgm:prSet presAssocID="{5E3EBA97-F378-488D-AE92-064461EB1CA7}" presName="sibTrans" presStyleCnt="0"/>
+      <dgm:spPr/>
+    </dgm:pt>
+    <dgm:pt modelId="{A9654CAC-E6AC-49C4-A89B-75699C0DB6D1}" type="pres">
+      <dgm:prSet presAssocID="{1EB49671-9B60-4117-AA89-19942FE3FED8}" presName="node" presStyleLbl="node1" presStyleIdx="1" presStyleCnt="4">
+        <dgm:presLayoutVars>
+          <dgm:bulletEnabled val="1"/>
+        </dgm:presLayoutVars>
+      </dgm:prSet>
+      <dgm:spPr/>
+    </dgm:pt>
+    <dgm:pt modelId="{B9B0D149-E9B7-4EB3-8048-8665A8E679F4}" type="pres">
+      <dgm:prSet presAssocID="{BF0AE0DD-EE9F-45CD-986D-AA80E18204C0}" presName="sibTrans" presStyleCnt="0"/>
+      <dgm:spPr/>
+    </dgm:pt>
+    <dgm:pt modelId="{42E63EC2-B264-47A4-A5F3-92E1704627FC}" type="pres">
+      <dgm:prSet presAssocID="{DE534155-B96B-4B5B-AFF3-0BE5F02EA329}" presName="node" presStyleLbl="node1" presStyleIdx="2" presStyleCnt="4">
+        <dgm:presLayoutVars>
+          <dgm:bulletEnabled val="1"/>
+        </dgm:presLayoutVars>
+      </dgm:prSet>
+      <dgm:spPr/>
+    </dgm:pt>
+    <dgm:pt modelId="{BCA7415A-C2C0-4204-B6F8-E0C91763B04F}" type="pres">
+      <dgm:prSet presAssocID="{2783D0E8-7BD4-45AF-9EA5-8ED2813BD385}" presName="sibTrans" presStyleCnt="0"/>
+      <dgm:spPr/>
+    </dgm:pt>
+    <dgm:pt modelId="{9D19D1FD-D9AD-44C2-86F9-52B9038C4421}" type="pres">
+      <dgm:prSet presAssocID="{D60E27BA-3999-4A07-8D1C-1CFB84828071}" presName="node" presStyleLbl="node1" presStyleIdx="3" presStyleCnt="4">
+        <dgm:presLayoutVars>
+          <dgm:bulletEnabled val="1"/>
+        </dgm:presLayoutVars>
+      </dgm:prSet>
+      <dgm:spPr/>
+    </dgm:pt>
+  </dgm:ptLst>
+  <dgm:cxnLst>
+    <dgm:cxn modelId="{0BE64E23-B5DE-4C87-9344-0B26CF18E826}" type="presOf" srcId="{63ACD774-593D-46A7-9541-6578062D6675}" destId="{AC0E12E3-7E90-4F5B-AFEE-1901A1908815}" srcOrd="0" destOrd="0" presId="urn:microsoft.com/office/officeart/2005/8/layout/default"/>
+    <dgm:cxn modelId="{E921EF5C-1A9D-48CF-B38F-3D4BFEC11CF7}" type="presOf" srcId="{DE534155-B96B-4B5B-AFF3-0BE5F02EA329}" destId="{42E63EC2-B264-47A4-A5F3-92E1704627FC}" srcOrd="0" destOrd="0" presId="urn:microsoft.com/office/officeart/2005/8/layout/default"/>
+    <dgm:cxn modelId="{3D417247-0274-46F1-A613-946C192E89D2}" srcId="{63ACD774-593D-46A7-9541-6578062D6675}" destId="{DE534155-B96B-4B5B-AFF3-0BE5F02EA329}" srcOrd="2" destOrd="0" parTransId="{F2BC1179-2BB6-44CC-A693-02D7BA07B090}" sibTransId="{2783D0E8-7BD4-45AF-9EA5-8ED2813BD385}"/>
+    <dgm:cxn modelId="{15E5A987-588D-43E6-B8CF-81551E1178D9}" type="presOf" srcId="{1EB49671-9B60-4117-AA89-19942FE3FED8}" destId="{A9654CAC-E6AC-49C4-A89B-75699C0DB6D1}" srcOrd="0" destOrd="0" presId="urn:microsoft.com/office/officeart/2005/8/layout/default"/>
+    <dgm:cxn modelId="{867B2791-C94D-4171-8CD4-888956D0E437}" srcId="{63ACD774-593D-46A7-9541-6578062D6675}" destId="{1EB49671-9B60-4117-AA89-19942FE3FED8}" srcOrd="1" destOrd="0" parTransId="{8FE63FAF-AFAD-426B-92A8-FBC81507CA1A}" sibTransId="{BF0AE0DD-EE9F-45CD-986D-AA80E18204C0}"/>
+    <dgm:cxn modelId="{79C090A9-BE46-422A-8E52-9C5156581EA6}" srcId="{63ACD774-593D-46A7-9541-6578062D6675}" destId="{ADEA78F0-8DDD-4FE6-8117-388B8E6EC488}" srcOrd="0" destOrd="0" parTransId="{8F2081CB-7D3C-46AC-BAB9-D3ADDEEC4CF8}" sibTransId="{5E3EBA97-F378-488D-AE92-064461EB1CA7}"/>
+    <dgm:cxn modelId="{922D34D9-648E-4B85-A662-6AD77E1D6A0E}" type="presOf" srcId="{ADEA78F0-8DDD-4FE6-8117-388B8E6EC488}" destId="{D23976C9-AA96-4A8F-B851-75490045A07D}" srcOrd="0" destOrd="0" presId="urn:microsoft.com/office/officeart/2005/8/layout/default"/>
+    <dgm:cxn modelId="{CC4499E0-EE0D-44EB-A6DE-E7DE6974CF96}" srcId="{63ACD774-593D-46A7-9541-6578062D6675}" destId="{D60E27BA-3999-4A07-8D1C-1CFB84828071}" srcOrd="3" destOrd="0" parTransId="{2A840C41-4757-42EA-84B4-38BF05EB2A22}" sibTransId="{EF4C18CC-D7EA-4707-A5B1-A414E17BDD5B}"/>
+    <dgm:cxn modelId="{C70EA0F1-EE7F-4AD0-9AFD-7B1CEECFBC93}" type="presOf" srcId="{D60E27BA-3999-4A07-8D1C-1CFB84828071}" destId="{9D19D1FD-D9AD-44C2-86F9-52B9038C4421}" srcOrd="0" destOrd="0" presId="urn:microsoft.com/office/officeart/2005/8/layout/default"/>
+    <dgm:cxn modelId="{CB7DDEB6-C9DA-42C5-94F4-73343C48EDA7}" type="presParOf" srcId="{AC0E12E3-7E90-4F5B-AFEE-1901A1908815}" destId="{D23976C9-AA96-4A8F-B851-75490045A07D}" srcOrd="0" destOrd="0" presId="urn:microsoft.com/office/officeart/2005/8/layout/default"/>
+    <dgm:cxn modelId="{7F30A9B5-5F60-4316-9CAD-60698850667A}" type="presParOf" srcId="{AC0E12E3-7E90-4F5B-AFEE-1901A1908815}" destId="{EF7F0DF8-368B-43BB-A248-7C972D216B89}" srcOrd="1" destOrd="0" presId="urn:microsoft.com/office/officeart/2005/8/layout/default"/>
+    <dgm:cxn modelId="{1555FC1F-B6AE-4803-9190-52C29FB9D1AE}" type="presParOf" srcId="{AC0E12E3-7E90-4F5B-AFEE-1901A1908815}" destId="{A9654CAC-E6AC-49C4-A89B-75699C0DB6D1}" srcOrd="2" destOrd="0" presId="urn:microsoft.com/office/officeart/2005/8/layout/default"/>
+    <dgm:cxn modelId="{E2E5BDE5-0B07-4D60-9511-A0F65E0BC597}" type="presParOf" srcId="{AC0E12E3-7E90-4F5B-AFEE-1901A1908815}" destId="{B9B0D149-E9B7-4EB3-8048-8665A8E679F4}" srcOrd="3" destOrd="0" presId="urn:microsoft.com/office/officeart/2005/8/layout/default"/>
+    <dgm:cxn modelId="{B5B4AB75-C648-4AB8-95F8-E81C0361930B}" type="presParOf" srcId="{AC0E12E3-7E90-4F5B-AFEE-1901A1908815}" destId="{42E63EC2-B264-47A4-A5F3-92E1704627FC}" srcOrd="4" destOrd="0" presId="urn:microsoft.com/office/officeart/2005/8/layout/default"/>
+    <dgm:cxn modelId="{3D16FF9F-1387-4575-8FE7-5D1B404B50A1}" type="presParOf" srcId="{AC0E12E3-7E90-4F5B-AFEE-1901A1908815}" destId="{BCA7415A-C2C0-4204-B6F8-E0C91763B04F}" srcOrd="5" destOrd="0" presId="urn:microsoft.com/office/officeart/2005/8/layout/default"/>
+    <dgm:cxn modelId="{16D0AB86-35DB-4297-89F9-5F38BBD4907A}" type="presParOf" srcId="{AC0E12E3-7E90-4F5B-AFEE-1901A1908815}" destId="{9D19D1FD-D9AD-44C2-86F9-52B9038C4421}" srcOrd="6" destOrd="0" presId="urn:microsoft.com/office/officeart/2005/8/layout/default"/>
+  </dgm:cxnLst>
+  <dgm:bg/>
+  <dgm:whole/>
+  <dgm:extLst>
+    <a:ext uri="http://schemas.microsoft.com/office/drawing/2008/diagram">
+      <dsp:dataModelExt xmlns:dsp="http://schemas.microsoft.com/office/drawing/2008/diagram" relId="rId6" minVer="http://schemas.openxmlformats.org/drawingml/2006/diagram"/>
+    </a:ext>
+  </dgm:extLst>
+</dgm:dataModel>
+</file>
+
+<file path=ppt/diagrams/drawing1.xml><?xml version="1.0" encoding="utf-8"?>
+<dsp:drawing xmlns:dgm="http://schemas.openxmlformats.org/drawingml/2006/diagram" xmlns:dsp="http://schemas.microsoft.com/office/drawing/2008/diagram" xmlns:a="http://schemas.openxmlformats.org/drawingml/2006/main">
+  <dsp:spTree>
+    <dsp:nvGrpSpPr>
+      <dsp:cNvPr id="0" name=""/>
+      <dsp:cNvGrpSpPr/>
+    </dsp:nvGrpSpPr>
+    <dsp:grpSpPr/>
+    <dsp:sp modelId="{D23976C9-AA96-4A8F-B851-75490045A07D}">
+      <dsp:nvSpPr>
+        <dsp:cNvPr id="0" name=""/>
+        <dsp:cNvSpPr/>
+      </dsp:nvSpPr>
+      <dsp:spPr>
+        <a:xfrm>
+          <a:off x="643" y="408034"/>
+          <a:ext cx="2508886" cy="1505331"/>
+        </a:xfrm>
+        <a:prstGeom prst="rect">
+          <a:avLst/>
+        </a:prstGeom>
+        <a:solidFill>
+          <a:schemeClr val="accent1">
+            <a:hueOff val="0"/>
+            <a:satOff val="0"/>
+            <a:lumOff val="0"/>
+            <a:alphaOff val="0"/>
+          </a:schemeClr>
+        </a:solidFill>
+        <a:ln w="15875" cap="rnd" cmpd="sng" algn="ctr">
+          <a:solidFill>
+            <a:schemeClr val="lt1">
+              <a:hueOff val="0"/>
+              <a:satOff val="0"/>
+              <a:lumOff val="0"/>
+              <a:alphaOff val="0"/>
+            </a:schemeClr>
+          </a:solidFill>
+          <a:prstDash val="solid"/>
+        </a:ln>
+        <a:effectLst/>
+      </dsp:spPr>
+      <dsp:style>
+        <a:lnRef idx="2">
+          <a:scrgbClr r="0" g="0" b="0"/>
+        </a:lnRef>
+        <a:fillRef idx="1">
+          <a:scrgbClr r="0" g="0" b="0"/>
+        </a:fillRef>
+        <a:effectRef idx="0">
+          <a:scrgbClr r="0" g="0" b="0"/>
+        </a:effectRef>
+        <a:fontRef idx="minor">
+          <a:schemeClr val="lt1"/>
+        </a:fontRef>
+      </dsp:style>
+      <dsp:txBody>
+        <a:bodyPr spcFirstLastPara="0" vert="horz" wrap="square" lIns="114300" tIns="114300" rIns="114300" bIns="114300" numCol="1" spcCol="1270" anchor="ctr" anchorCtr="0">
+          <a:noAutofit/>
+        </a:bodyPr>
+        <a:lstStyle/>
+        <a:p>
+          <a:pPr marL="0" lvl="0" indent="0" algn="ctr" defTabSz="1333500">
+            <a:lnSpc>
+              <a:spcPct val="90000"/>
+            </a:lnSpc>
+            <a:spcBef>
+              <a:spcPct val="0"/>
+            </a:spcBef>
+            <a:spcAft>
+              <a:spcPct val="35000"/>
+            </a:spcAft>
+            <a:buNone/>
+          </a:pPr>
+          <a:r>
+            <a:rPr lang="en-ZA" sz="3000" kern="1200" dirty="0"/>
+            <a:t>Use Cases and Progress</a:t>
+          </a:r>
+        </a:p>
+      </dsp:txBody>
+      <dsp:txXfrm>
+        <a:off x="643" y="408034"/>
+        <a:ext cx="2508886" cy="1505331"/>
+      </dsp:txXfrm>
+    </dsp:sp>
+    <dsp:sp modelId="{A9654CAC-E6AC-49C4-A89B-75699C0DB6D1}">
+      <dsp:nvSpPr>
+        <dsp:cNvPr id="0" name=""/>
+        <dsp:cNvSpPr/>
+      </dsp:nvSpPr>
+      <dsp:spPr>
+        <a:xfrm>
+          <a:off x="2760418" y="408034"/>
+          <a:ext cx="2508886" cy="1505331"/>
+        </a:xfrm>
+        <a:prstGeom prst="rect">
+          <a:avLst/>
+        </a:prstGeom>
+        <a:solidFill>
+          <a:schemeClr val="accent1">
+            <a:hueOff val="0"/>
+            <a:satOff val="0"/>
+            <a:lumOff val="0"/>
+            <a:alphaOff val="0"/>
+          </a:schemeClr>
+        </a:solidFill>
+        <a:ln w="15875" cap="rnd" cmpd="sng" algn="ctr">
+          <a:solidFill>
+            <a:schemeClr val="lt1">
+              <a:hueOff val="0"/>
+              <a:satOff val="0"/>
+              <a:lumOff val="0"/>
+              <a:alphaOff val="0"/>
+            </a:schemeClr>
+          </a:solidFill>
+          <a:prstDash val="solid"/>
+        </a:ln>
+        <a:effectLst/>
+      </dsp:spPr>
+      <dsp:style>
+        <a:lnRef idx="2">
+          <a:scrgbClr r="0" g="0" b="0"/>
+        </a:lnRef>
+        <a:fillRef idx="1">
+          <a:scrgbClr r="0" g="0" b="0"/>
+        </a:fillRef>
+        <a:effectRef idx="0">
+          <a:scrgbClr r="0" g="0" b="0"/>
+        </a:effectRef>
+        <a:fontRef idx="minor">
+          <a:schemeClr val="lt1"/>
+        </a:fontRef>
+      </dsp:style>
+      <dsp:txBody>
+        <a:bodyPr spcFirstLastPara="0" vert="horz" wrap="square" lIns="114300" tIns="114300" rIns="114300" bIns="114300" numCol="1" spcCol="1270" anchor="ctr" anchorCtr="0">
+          <a:noAutofit/>
+        </a:bodyPr>
+        <a:lstStyle/>
+        <a:p>
+          <a:pPr marL="0" lvl="0" indent="0" algn="ctr" defTabSz="1333500">
+            <a:lnSpc>
+              <a:spcPct val="90000"/>
+            </a:lnSpc>
+            <a:spcBef>
+              <a:spcPct val="0"/>
+            </a:spcBef>
+            <a:spcAft>
+              <a:spcPct val="35000"/>
+            </a:spcAft>
+            <a:buNone/>
+          </a:pPr>
+          <a:r>
+            <a:rPr lang="en-ZA" sz="3000" kern="1200" dirty="0"/>
+            <a:t>Unit and Integration Testing</a:t>
+          </a:r>
+        </a:p>
+      </dsp:txBody>
+      <dsp:txXfrm>
+        <a:off x="2760418" y="408034"/>
+        <a:ext cx="2508886" cy="1505331"/>
+      </dsp:txXfrm>
+    </dsp:sp>
+    <dsp:sp modelId="{42E63EC2-B264-47A4-A5F3-92E1704627FC}">
+      <dsp:nvSpPr>
+        <dsp:cNvPr id="0" name=""/>
+        <dsp:cNvSpPr/>
+      </dsp:nvSpPr>
+      <dsp:spPr>
+        <a:xfrm>
+          <a:off x="643" y="2164254"/>
+          <a:ext cx="2508886" cy="1505331"/>
+        </a:xfrm>
+        <a:prstGeom prst="rect">
+          <a:avLst/>
+        </a:prstGeom>
+        <a:solidFill>
+          <a:schemeClr val="accent1">
+            <a:hueOff val="0"/>
+            <a:satOff val="0"/>
+            <a:lumOff val="0"/>
+            <a:alphaOff val="0"/>
+          </a:schemeClr>
+        </a:solidFill>
+        <a:ln w="15875" cap="rnd" cmpd="sng" algn="ctr">
+          <a:solidFill>
+            <a:schemeClr val="lt1">
+              <a:hueOff val="0"/>
+              <a:satOff val="0"/>
+              <a:lumOff val="0"/>
+              <a:alphaOff val="0"/>
+            </a:schemeClr>
+          </a:solidFill>
+          <a:prstDash val="solid"/>
+        </a:ln>
+        <a:effectLst/>
+      </dsp:spPr>
+      <dsp:style>
+        <a:lnRef idx="2">
+          <a:scrgbClr r="0" g="0" b="0"/>
+        </a:lnRef>
+        <a:fillRef idx="1">
+          <a:scrgbClr r="0" g="0" b="0"/>
+        </a:fillRef>
+        <a:effectRef idx="0">
+          <a:scrgbClr r="0" g="0" b="0"/>
+        </a:effectRef>
+        <a:fontRef idx="minor">
+          <a:schemeClr val="lt1"/>
+        </a:fontRef>
+      </dsp:style>
+      <dsp:txBody>
+        <a:bodyPr spcFirstLastPara="0" vert="horz" wrap="square" lIns="114300" tIns="114300" rIns="114300" bIns="114300" numCol="1" spcCol="1270" anchor="ctr" anchorCtr="0">
+          <a:noAutofit/>
+        </a:bodyPr>
+        <a:lstStyle/>
+        <a:p>
+          <a:pPr marL="0" lvl="0" indent="0" algn="ctr" defTabSz="1333500">
+            <a:lnSpc>
+              <a:spcPct val="90000"/>
+            </a:lnSpc>
+            <a:spcBef>
+              <a:spcPct val="0"/>
+            </a:spcBef>
+            <a:spcAft>
+              <a:spcPct val="35000"/>
+            </a:spcAft>
+            <a:buNone/>
+          </a:pPr>
+          <a:r>
+            <a:rPr lang="en-ZA" sz="3000" kern="1200" dirty="0"/>
+            <a:t>Admin Interface</a:t>
+          </a:r>
+        </a:p>
+      </dsp:txBody>
+      <dsp:txXfrm>
+        <a:off x="643" y="2164254"/>
+        <a:ext cx="2508886" cy="1505331"/>
+      </dsp:txXfrm>
+    </dsp:sp>
+    <dsp:sp modelId="{9D19D1FD-D9AD-44C2-86F9-52B9038C4421}">
+      <dsp:nvSpPr>
+        <dsp:cNvPr id="0" name=""/>
+        <dsp:cNvSpPr/>
+      </dsp:nvSpPr>
+      <dsp:spPr>
+        <a:xfrm>
+          <a:off x="2760418" y="2164254"/>
+          <a:ext cx="2508886" cy="1505331"/>
+        </a:xfrm>
+        <a:prstGeom prst="rect">
+          <a:avLst/>
+        </a:prstGeom>
+        <a:solidFill>
+          <a:schemeClr val="accent1">
+            <a:hueOff val="0"/>
+            <a:satOff val="0"/>
+            <a:lumOff val="0"/>
+            <a:alphaOff val="0"/>
+          </a:schemeClr>
+        </a:solidFill>
+        <a:ln w="15875" cap="rnd" cmpd="sng" algn="ctr">
+          <a:solidFill>
+            <a:schemeClr val="lt1">
+              <a:hueOff val="0"/>
+              <a:satOff val="0"/>
+              <a:lumOff val="0"/>
+              <a:alphaOff val="0"/>
+            </a:schemeClr>
+          </a:solidFill>
+          <a:prstDash val="solid"/>
+        </a:ln>
+        <a:effectLst/>
+      </dsp:spPr>
+      <dsp:style>
+        <a:lnRef idx="2">
+          <a:scrgbClr r="0" g="0" b="0"/>
+        </a:lnRef>
+        <a:fillRef idx="1">
+          <a:scrgbClr r="0" g="0" b="0"/>
+        </a:fillRef>
+        <a:effectRef idx="0">
+          <a:scrgbClr r="0" g="0" b="0"/>
+        </a:effectRef>
+        <a:fontRef idx="minor">
+          <a:schemeClr val="lt1"/>
+        </a:fontRef>
+      </dsp:style>
+      <dsp:txBody>
+        <a:bodyPr spcFirstLastPara="0" vert="horz" wrap="square" lIns="114300" tIns="114300" rIns="114300" bIns="114300" numCol="1" spcCol="1270" anchor="ctr" anchorCtr="0">
+          <a:noAutofit/>
+        </a:bodyPr>
+        <a:lstStyle/>
+        <a:p>
+          <a:pPr marL="0" lvl="0" indent="0" algn="ctr" defTabSz="1333500">
+            <a:lnSpc>
+              <a:spcPct val="90000"/>
+            </a:lnSpc>
+            <a:spcBef>
+              <a:spcPct val="0"/>
+            </a:spcBef>
+            <a:spcAft>
+              <a:spcPct val="35000"/>
+            </a:spcAft>
+            <a:buNone/>
+          </a:pPr>
+          <a:r>
+            <a:rPr lang="en-ZA" sz="3000" kern="1200" dirty="0"/>
+            <a:t>Mobile App</a:t>
+          </a:r>
+        </a:p>
+      </dsp:txBody>
+      <dsp:txXfrm>
+        <a:off x="2760418" y="2164254"/>
+        <a:ext cx="2508886" cy="1505331"/>
+      </dsp:txXfrm>
+    </dsp:sp>
+  </dsp:spTree>
+</dsp:drawing>
+</file>
+
+<file path=ppt/diagrams/layout1.xml><?xml version="1.0" encoding="utf-8"?>
+<dgm:layoutDef xmlns:dgm="http://schemas.openxmlformats.org/drawingml/2006/diagram" xmlns:a="http://schemas.openxmlformats.org/drawingml/2006/main" uniqueId="urn:microsoft.com/office/officeart/2005/8/layout/default">
+  <dgm:title val=""/>
+  <dgm:desc val=""/>
+  <dgm:catLst>
+    <dgm:cat type="list" pri="400"/>
+  </dgm:catLst>
+  <dgm:sampData>
+    <dgm:dataModel>
+      <dgm:ptLst>
+        <dgm:pt modelId="0" type="doc"/>
+        <dgm:pt modelId="1">
+          <dgm:prSet phldr="1"/>
+        </dgm:pt>
+        <dgm:pt modelId="2">
+          <dgm:prSet phldr="1"/>
+        </dgm:pt>
+        <dgm:pt modelId="3">
+          <dgm:prSet phldr="1"/>
+        </dgm:pt>
+        <dgm:pt modelId="4">
+          <dgm:prSet phldr="1"/>
+        </dgm:pt>
+        <dgm:pt modelId="5">
+          <dgm:prSet phldr="1"/>
+        </dgm:pt>
+      </dgm:ptLst>
+      <dgm:cxnLst>
+        <dgm:cxn modelId="6" srcId="0" destId="1" srcOrd="0" destOrd="0"/>
+        <dgm:cxn modelId="7" srcId="0" destId="2" srcOrd="1" destOrd="0"/>
+        <dgm:cxn modelId="8" srcId="0" destId="3" srcOrd="2" destOrd="0"/>
+        <dgm:cxn modelId="9" srcId="0" destId="4" srcOrd="3" destOrd="0"/>
+        <dgm:cxn modelId="10" srcId="0" destId="5" srcOrd="4" destOrd="0"/>
+      </dgm:cxnLst>
+      <dgm:bg/>
+      <dgm:whole/>
+    </dgm:dataModel>
+  </dgm:sampData>
+  <dgm:styleData>
+    <dgm:dataModel>
+      <dgm:ptLst>
+        <dgm:pt modelId="0" type="doc"/>
+        <dgm:pt modelId="1"/>
+        <dgm:pt modelId="2"/>
+      </dgm:ptLst>
+      <dgm:cxnLst>
+        <dgm:cxn modelId="3" srcId="0" destId="1" srcOrd="0" destOrd="0"/>
+        <dgm:cxn modelId="4" srcId="0" destId="2" srcOrd="1" destOrd="0"/>
+      </dgm:cxnLst>
+      <dgm:bg/>
+      <dgm:whole/>
+    </dgm:dataModel>
+  </dgm:styleData>
+  <dgm:clrData>
+    <dgm:dataModel>
+      <dgm:ptLst>
+        <dgm:pt modelId="0" type="doc"/>
+        <dgm:pt modelId="1"/>
+        <dgm:pt modelId="2"/>
+        <dgm:pt modelId="3"/>
+        <dgm:pt modelId="4"/>
+        <dgm:pt modelId="5"/>
+        <dgm:pt modelId="6"/>
+      </dgm:ptLst>
+      <dgm:cxnLst>
+        <dgm:cxn modelId="7" srcId="0" destId="1" srcOrd="0" destOrd="0"/>
+        <dgm:cxn modelId="8" srcId="0" destId="2" srcOrd="1" destOrd="0"/>
+        <dgm:cxn modelId="9" srcId="0" destId="3" srcOrd="2" destOrd="0"/>
+        <dgm:cxn modelId="10" srcId="0" destId="4" srcOrd="3" destOrd="0"/>
+        <dgm:cxn modelId="11" srcId="0" destId="5" srcOrd="4" destOrd="0"/>
+        <dgm:cxn modelId="12" srcId="0" destId="6" srcOrd="5" destOrd="0"/>
+      </dgm:cxnLst>
+      <dgm:bg/>
+      <dgm:whole/>
+    </dgm:dataModel>
+  </dgm:clrData>
+  <dgm:layoutNode name="diagram">
+    <dgm:varLst>
+      <dgm:dir/>
+      <dgm:resizeHandles val="exact"/>
+    </dgm:varLst>
+    <dgm:choose name="Name0">
+      <dgm:if name="Name1" func="var" arg="dir" op="equ" val="norm">
+        <dgm:alg type="snake">
+          <dgm:param type="grDir" val="tL"/>
+          <dgm:param type="flowDir" val="row"/>
+          <dgm:param type="contDir" val="sameDir"/>
+          <dgm:param type="off" val="ctr"/>
+        </dgm:alg>
+      </dgm:if>
+      <dgm:else name="Name2">
+        <dgm:alg type="snake">
+          <dgm:param type="grDir" val="tR"/>
+          <dgm:param type="flowDir" val="row"/>
+          <dgm:param type="contDir" val="sameDir"/>
+          <dgm:param type="off" val="ctr"/>
+        </dgm:alg>
+      </dgm:else>
+    </dgm:choose>
+    <dgm:shape xmlns:r="http://schemas.openxmlformats.org/officeDocument/2006/relationships" r:blip="">
+      <dgm:adjLst/>
+    </dgm:shape>
+    <dgm:presOf/>
+    <dgm:constrLst>
+      <dgm:constr type="w" for="ch" forName="node" refType="w"/>
+      <dgm:constr type="h" for="ch" forName="node" refType="w" refFor="ch" refForName="node" fact="0.6"/>
+      <dgm:constr type="w" for="ch" forName="sibTrans" refType="w" refFor="ch" refForName="node" fact="0.1"/>
+      <dgm:constr type="sp" refType="w" refFor="ch" refForName="sibTrans"/>
+      <dgm:constr type="primFontSz" for="ch" forName="node" op="equ" val="65"/>
+    </dgm:constrLst>
+    <dgm:ruleLst/>
+    <dgm:forEach name="Name3" axis="ch" ptType="node">
+      <dgm:layoutNode name="node">
+        <dgm:varLst>
+          <dgm:bulletEnabled val="1"/>
+        </dgm:varLst>
+        <dgm:alg type="tx"/>
+        <dgm:shape xmlns:r="http://schemas.openxmlformats.org/officeDocument/2006/relationships" type="rect" r:blip="">
+          <dgm:adjLst/>
+        </dgm:shape>
+        <dgm:presOf axis="desOrSelf" ptType="node"/>
+        <dgm:constrLst>
+          <dgm:constr type="lMarg" refType="primFontSz" fact="0.3"/>
+          <dgm:constr type="rMarg" refType="primFontSz" fact="0.3"/>
+          <dgm:constr type="tMarg" refType="primFontSz" fact="0.3"/>
+          <dgm:constr type="bMarg" refType="primFontSz" fact="0.3"/>
+        </dgm:constrLst>
+        <dgm:ruleLst>
+          <dgm:rule type="primFontSz" val="5" fact="NaN" max="NaN"/>
+        </dgm:ruleLst>
+      </dgm:layoutNode>
+      <dgm:forEach name="Name4" axis="followSib" ptType="sibTrans" cnt="1">
+        <dgm:layoutNode name="sibTrans">
+          <dgm:alg type="sp"/>
+          <dgm:shape xmlns:r="http://schemas.openxmlformats.org/officeDocument/2006/relationships" r:blip="">
+            <dgm:adjLst/>
+          </dgm:shape>
+          <dgm:presOf/>
+          <dgm:constrLst/>
+          <dgm:ruleLst/>
+        </dgm:layoutNode>
+      </dgm:forEach>
+    </dgm:forEach>
+  </dgm:layoutNode>
+</dgm:layoutDef>
+</file>
+
+<file path=ppt/diagrams/quickStyle1.xml><?xml version="1.0" encoding="utf-8"?>
+<dgm:styleDef xmlns:dgm="http://schemas.openxmlformats.org/drawingml/2006/diagram" xmlns:a="http://schemas.openxmlformats.org/drawingml/2006/main" uniqueId="urn:microsoft.com/office/officeart/2005/8/quickstyle/simple1">
+  <dgm:title val=""/>
+  <dgm:desc val=""/>
+  <dgm:catLst>
+    <dgm:cat type="simple" pri="10100"/>
+  </dgm:catLst>
+  <dgm:scene3d>
+    <a:camera prst="orthographicFront"/>
+    <a:lightRig rig="threePt" dir="t"/>
+  </dgm:scene3d>
+  <dgm:styleLbl name="node0">
+    <dgm:scene3d>
+      <a:camera prst="orthographicFront"/>
+      <a:lightRig rig="threePt" dir="t"/>
+    </dgm:scene3d>
+    <dgm:sp3d/>
+    <dgm:txPr/>
+    <dgm:style>
+      <a:lnRef idx="2">
+        <a:scrgbClr r="0" g="0" b="0"/>
+      </a:lnRef>
+      <a:fillRef idx="1">
+        <a:scrgbClr r="0" g="0" b="0"/>
+      </a:fillRef>
+      <a:effectRef idx="0">
+        <a:scrgbClr r="0" g="0" b="0"/>
+      </a:effectRef>
+      <a:fontRef idx="minor">
+        <a:schemeClr val="lt1"/>
+      </a:fontRef>
+    </dgm:style>
+  </dgm:styleLbl>
+  <dgm:styleLbl name="lnNode1">
+    <dgm:scene3d>
+      <a:camera prst="orthographicFront"/>
+      <a:lightRig rig="threePt" dir="t"/>
+    </dgm:scene3d>
+    <dgm:sp3d/>
+    <dgm:txPr/>
+    <dgm:style>
+      <a:lnRef idx="2">
+        <a:scrgbClr r="0" g="0" b="0"/>
+      </a:lnRef>
+      <a:fillRef idx="1">
+        <a:scrgbClr r="0" g="0" b="0"/>
+      </a:fillRef>
+      <a:effectRef idx="0">
+        <a:scrgbClr r="0" g="0" b="0"/>
+      </a:effectRef>
+      <a:fontRef idx="minor">
+        <a:schemeClr val="lt1"/>
+      </a:fontRef>
+    </dgm:style>
+  </dgm:styleLbl>
+  <dgm:styleLbl name="vennNode1">
+    <dgm:scene3d>
+      <a:camera prst="orthographicFront"/>
+      <a:lightRig rig="threePt" dir="t"/>
+    </dgm:scene3d>
+    <dgm:sp3d/>
+    <dgm:txPr/>
+    <dgm:style>
+      <a:lnRef idx="2">
+        <a:scrgbClr r="0" g="0" b="0"/>
+      </a:lnRef>
+      <a:fillRef idx="1">
+        <a:scrgbClr r="0" g="0" b="0"/>
+      </a:fillRef>
+      <a:effectRef idx="0">
+        <a:scrgbClr r="0" g="0" b="0"/>
+      </a:effectRef>
+      <a:fontRef idx="minor">
+        <a:schemeClr val="tx1"/>
+      </a:fontRef>
+    </dgm:style>
+  </dgm:styleLbl>
+  <dgm:styleLbl name="alignNode1">
+    <dgm:scene3d>
+      <a:camera prst="orthographicFront"/>
+      <a:lightRig rig="threePt" dir="t"/>
+    </dgm:scene3d>
+    <dgm:sp3d/>
+    <dgm:txPr/>
+    <dgm:style>
+      <a:lnRef idx="2">
+        <a:scrgbClr r="0" g="0" b="0"/>
+      </a:lnRef>
+      <a:fillRef idx="1">
+        <a:scrgbClr r="0" g="0" b="0"/>
+      </a:fillRef>
+      <a:effectRef idx="0">
+        <a:scrgbClr r="0" g="0" b="0"/>
+      </a:effectRef>
+      <a:fontRef idx="minor">
+        <a:schemeClr val="lt1"/>
+      </a:fontRef>
+    </dgm:style>
+  </dgm:styleLbl>
+  <dgm:styleLbl name="node1">
+    <dgm:scene3d>
+      <a:camera prst="orthographicFront"/>
+      <a:lightRig rig="threePt" dir="t"/>
+    </dgm:scene3d>
+    <dgm:sp3d/>
+    <dgm:txPr/>
+    <dgm:style>
+      <a:lnRef idx="2">
+        <a:scrgbClr r="0" g="0" b="0"/>
+      </a:lnRef>
+      <a:fillRef idx="1">
+        <a:scrgbClr r="0" g="0" b="0"/>
+      </a:fillRef>
+      <a:effectRef idx="0">
+        <a:scrgbClr r="0" g="0" b="0"/>
+      </a:effectRef>
+      <a:fontRef idx="minor">
+        <a:schemeClr val="lt1"/>
+      </a:fontRef>
+    </dgm:style>
+  </dgm:styleLbl>
+  <dgm:styleLbl name="node2">
+    <dgm:scene3d>
+      <a:camera prst="orthographicFront"/>
+      <a:lightRig rig="threePt" dir="t"/>
+    </dgm:scene3d>
+    <dgm:sp3d/>
+    <dgm:txPr/>
+    <dgm:style>
+      <a:lnRef idx="2">
+        <a:scrgbClr r="0" g="0" b="0"/>
+      </a:lnRef>
+      <a:fillRef idx="1">
+        <a:scrgbClr r="0" g="0" b="0"/>
+      </a:fillRef>
+      <a:effectRef idx="0">
+        <a:scrgbClr r="0" g="0" b="0"/>
+      </a:effectRef>
+      <a:fontRef idx="minor">
+        <a:schemeClr val="lt1"/>
+      </a:fontRef>
+    </dgm:style>
+  </dgm:styleLbl>
+  <dgm:styleLbl name="node3">
+    <dgm:scene3d>
+      <a:camera prst="orthographicFront"/>
+      <a:lightRig rig="threePt" dir="t"/>
+    </dgm:scene3d>
+    <dgm:sp3d/>
+    <dgm:txPr/>
+    <dgm:style>
+      <a:lnRef idx="2">
+        <a:scrgbClr r="0" g="0" b="0"/>
+      </a:lnRef>
+      <a:fillRef idx="1">
+        <a:scrgbClr r="0" g="0" b="0"/>
+      </a:fillRef>
+      <a:effectRef idx="0">
+        <a:scrgbClr r="0" g="0" b="0"/>
+      </a:effectRef>
+      <a:fontRef idx="minor">
+        <a:schemeClr val="lt1"/>
+      </a:fontRef>
+    </dgm:style>
+  </dgm:styleLbl>
+  <dgm:styleLbl name="node4">
+    <dgm:scene3d>
+      <a:camera prst="orthographicFront"/>
+      <a:lightRig rig="threePt" dir="t"/>
+    </dgm:scene3d>
+    <dgm:sp3d/>
+    <dgm:txPr/>
+    <dgm:style>
+      <a:lnRef idx="2">
+        <a:scrgbClr r="0" g="0" b="0"/>
+      </a:lnRef>
+      <a:fillRef idx="1">
+        <a:scrgbClr r="0" g="0" b="0"/>
+      </a:fillRef>
+      <a:effectRef idx="0">
+        <a:scrgbClr r="0" g="0" b="0"/>
+      </a:effectRef>
+      <a:fontRef idx="minor">
+        <a:schemeClr val="lt1"/>
+      </a:fontRef>
+    </dgm:style>
+  </dgm:styleLbl>
+  <dgm:styleLbl name="fgImgPlace1">
+    <dgm:scene3d>
+      <a:camera prst="orthographicFront"/>
+      <a:lightRig rig="threePt" dir="t"/>
+    </dgm:scene3d>
+    <dgm:sp3d/>
+    <dgm:txPr/>
+    <dgm:style>
+      <a:lnRef idx="2">
+        <a:scrgbClr r="0" g="0" b="0"/>
+      </a:lnRef>
+      <a:fillRef idx="1">
+        <a:scrgbClr r="0" g="0" b="0"/>
+      </a:fillRef>
+      <a:effectRef idx="0">
+        <a:scrgbClr r="0" g="0" b="0"/>
+      </a:effectRef>
+      <a:fontRef idx="minor"/>
+    </dgm:style>
+  </dgm:styleLbl>
+  <dgm:styleLbl name="alignImgPlace1">
+    <dgm:scene3d>
+      <a:camera prst="orthographicFront"/>
+      <a:lightRig rig="threePt" dir="t"/>
+    </dgm:scene3d>
+    <dgm:sp3d/>
+    <dgm:txPr/>
+    <dgm:style>
+      <a:lnRef idx="2">
+        <a:scrgbClr r="0" g="0" b="0"/>
+      </a:lnRef>
+      <a:fillRef idx="1">
+        <a:scrgbClr r="0" g="0" b="0"/>
+      </a:fillRef>
+      <a:effectRef idx="0">
+        <a:scrgbClr r="0" g="0" b="0"/>
+      </a:effectRef>
+      <a:fontRef idx="minor"/>
+    </dgm:style>
+  </dgm:styleLbl>
+  <dgm:styleLbl name="bgImgPlace1">
+    <dgm:scene3d>
+      <a:camera prst="orthographicFront"/>
+      <a:lightRig rig="threePt" dir="t"/>
+    </dgm:scene3d>
+    <dgm:sp3d/>
+    <dgm:txPr/>
+    <dgm:style>
+      <a:lnRef idx="2">
+        <a:scrgbClr r="0" g="0" b="0"/>
+      </a:lnRef>
+      <a:fillRef idx="1">
+        <a:scrgbClr r="0" g="0" b="0"/>
+      </a:fillRef>
+      <a:effectRef idx="0">
+        <a:scrgbClr r="0" g="0" b="0"/>
+      </a:effectRef>
+      <a:fontRef idx="minor"/>
+    </dgm:style>
+  </dgm:styleLbl>
+  <dgm:styleLbl name="sibTrans2D1">
+    <dgm:scene3d>
+      <a:camera prst="orthographicFront"/>
+      <a:lightRig rig="threePt" dir="t"/>
+    </dgm:scene3d>
+    <dgm:sp3d/>
+    <dgm:txPr/>
+    <dgm:style>
+      <a:lnRef idx="0">
+        <a:scrgbClr r="0" g="0" b="0"/>
+      </a:lnRef>
+      <a:fillRef idx="1">
+        <a:scrgbClr r="0" g="0" b="0"/>
+      </a:fillRef>
+      <a:effectRef idx="0">
+        <a:scrgbClr r="0" g="0" b="0"/>
+      </a:effectRef>
+      <a:fontRef idx="minor">
+        <a:schemeClr val="lt1"/>
+      </a:fontRef>
+    </dgm:style>
+  </dgm:styleLbl>
+  <dgm:styleLbl name="fgSibTrans2D1">
+    <dgm:scene3d>
+      <a:camera prst="orthographicFront"/>
+      <a:lightRig rig="threePt" dir="t"/>
+    </dgm:scene3d>
+    <dgm:sp3d/>
+    <dgm:txPr/>
+    <dgm:style>
+      <a:lnRef idx="0">
+        <a:scrgbClr r="0" g="0" b="0"/>
+      </a:lnRef>
+      <a:fillRef idx="1">
+        <a:scrgbClr r="0" g="0" b="0"/>
+      </a:fillRef>
+      <a:effectRef idx="0">
+        <a:scrgbClr r="0" g="0" b="0"/>
+      </a:effectRef>
+      <a:fontRef idx="minor">
+        <a:schemeClr val="lt1"/>
+      </a:fontRef>
+    </dgm:style>
+  </dgm:styleLbl>
+  <dgm:styleLbl name="bgSibTrans2D1">
+    <dgm:scene3d>
+      <a:camera prst="orthographicFront"/>
+      <a:lightRig rig="threePt" dir="t"/>
+    </dgm:scene3d>
+    <dgm:sp3d/>
+    <dgm:txPr/>
+    <dgm:style>
+      <a:lnRef idx="0">
+        <a:scrgbClr r="0" g="0" b="0"/>
+      </a:lnRef>
+      <a:fillRef idx="1">
+        <a:scrgbClr r="0" g="0" b="0"/>
+      </a:fillRef>
+      <a:effectRef idx="0">
+        <a:scrgbClr r="0" g="0" b="0"/>
+      </a:effectRef>
+      <a:fontRef idx="minor">
+        <a:schemeClr val="lt1"/>
+      </a:fontRef>
+    </dgm:style>
+  </dgm:styleLbl>
+  <dgm:styleLbl name="sibTrans1D1">
+    <dgm:scene3d>
+      <a:camera prst="orthographicFront"/>
+      <a:lightRig rig="threePt" dir="t"/>
+    </dgm:scene3d>
+    <dgm:sp3d/>
+    <dgm:txPr/>
+    <dgm:style>
+      <a:lnRef idx="1">
+        <a:scrgbClr r="0" g="0" b="0"/>
+      </a:lnRef>
+      <a:fillRef idx="0">
+        <a:scrgbClr r="0" g="0" b="0"/>
+      </a:fillRef>
+      <a:effectRef idx="0">
+        <a:scrgbClr r="0" g="0" b="0"/>
+      </a:effectRef>
+      <a:fontRef idx="minor"/>
+    </dgm:style>
+  </dgm:styleLbl>
+  <dgm:styleLbl name="callout">
+    <dgm:scene3d>
+      <a:camera prst="orthographicFront"/>
+      <a:lightRig rig="threePt" dir="t"/>
+    </dgm:scene3d>
+    <dgm:sp3d/>
+    <dgm:txPr/>
+    <dgm:style>
+      <a:lnRef idx="2">
+        <a:scrgbClr r="0" g="0" b="0"/>
+      </a:lnRef>
+      <a:fillRef idx="1">
+        <a:scrgbClr r="0" g="0" b="0"/>
+      </a:fillRef>
+      <a:effectRef idx="0">
+        <a:scrgbClr r="0" g="0" b="0"/>
+      </a:effectRef>
+      <a:fontRef idx="minor"/>
+    </dgm:style>
+  </dgm:styleLbl>
+  <dgm:styleLbl name="asst0">
+    <dgm:scene3d>
+      <a:camera prst="orthographicFront"/>
+      <a:lightRig rig="threePt" dir="t"/>
+    </dgm:scene3d>
+    <dgm:sp3d/>
+    <dgm:txPr/>
+    <dgm:style>
+      <a:lnRef idx="2">
+        <a:scrgbClr r="0" g="0" b="0"/>
+      </a:lnRef>
+      <a:fillRef idx="1">
+        <a:scrgbClr r="0" g="0" b="0"/>
+      </a:fillRef>
+      <a:effectRef idx="0">
+        <a:scrgbClr r="0" g="0" b="0"/>
+      </a:effectRef>
+      <a:fontRef idx="minor">
+        <a:schemeClr val="lt1"/>
+      </a:fontRef>
+    </dgm:style>
+  </dgm:styleLbl>
+  <dgm:styleLbl name="asst1">
+    <dgm:scene3d>
+      <a:camera prst="orthographicFront"/>
+      <a:lightRig rig="threePt" dir="t"/>
+    </dgm:scene3d>
+    <dgm:sp3d/>
+    <dgm:txPr/>
+    <dgm:style>
+      <a:lnRef idx="2">
+        <a:scrgbClr r="0" g="0" b="0"/>
+      </a:lnRef>
+      <a:fillRef idx="1">
+        <a:scrgbClr r="0" g="0" b="0"/>
+      </a:fillRef>
+      <a:effectRef idx="0">
+        <a:scrgbClr r="0" g="0" b="0"/>
+      </a:effectRef>
+      <a:fontRef idx="minor">
+        <a:schemeClr val="lt1"/>
+      </a:fontRef>
+    </dgm:style>
+  </dgm:styleLbl>
+  <dgm:styleLbl name="asst2">
+    <dgm:scene3d>
+      <a:camera prst="orthographicFront"/>
+      <a:lightRig rig="threePt" dir="t"/>
+    </dgm:scene3d>
+    <dgm:sp3d/>
+    <dgm:txPr/>
+    <dgm:style>
+      <a:lnRef idx="2">
+        <a:scrgbClr r="0" g="0" b="0"/>
+      </a:lnRef>
+      <a:fillRef idx="1">
+        <a:scrgbClr r="0" g="0" b="0"/>
+      </a:fillRef>
+      <a:effectRef idx="0">
+        <a:scrgbClr r="0" g="0" b="0"/>
+      </a:effectRef>
+      <a:fontRef idx="minor">
+        <a:schemeClr val="lt1"/>
+      </a:fontRef>
+    </dgm:style>
+  </dgm:styleLbl>
+  <dgm:styleLbl name="asst3">
+    <dgm:scene3d>
+      <a:camera prst="orthographicFront"/>
+      <a:lightRig rig="threePt" dir="t"/>
+    </dgm:scene3d>
+    <dgm:sp3d/>
+    <dgm:txPr/>
+    <dgm:style>
+      <a:lnRef idx="2">
+        <a:scrgbClr r="0" g="0" b="0"/>
+      </a:lnRef>
+      <a:fillRef idx="1">
+        <a:scrgbClr r="0" g="0" b="0"/>
+      </a:fillRef>
+      <a:effectRef idx="0">
+        <a:scrgbClr r="0" g="0" b="0"/>
+      </a:effectRef>
+      <a:fontRef idx="minor">
+        <a:schemeClr val="lt1"/>
+      </a:fontRef>
+    </dgm:style>
+  </dgm:styleLbl>
+  <dgm:styleLbl name="asst4">
+    <dgm:scene3d>
+      <a:camera prst="orthographicFront"/>
+      <a:lightRig rig="threePt" dir="t"/>
+    </dgm:scene3d>
+    <dgm:sp3d/>
+    <dgm:txPr/>
+    <dgm:style>
+      <a:lnRef idx="2">
+        <a:scrgbClr r="0" g="0" b="0"/>
+      </a:lnRef>
+      <a:fillRef idx="1">
+        <a:scrgbClr r="0" g="0" b="0"/>
+      </a:fillRef>
+      <a:effectRef idx="0">
+        <a:scrgbClr r="0" g="0" b="0"/>
+      </a:effectRef>
+      <a:fontRef idx="minor">
+        <a:schemeClr val="lt1"/>
+      </a:fontRef>
+    </dgm:style>
+  </dgm:styleLbl>
+  <dgm:styleLbl name="parChTrans2D1">
+    <dgm:scene3d>
+      <a:camera prst="orthographicFront"/>
+      <a:lightRig rig="threePt" dir="t"/>
+    </dgm:scene3d>
+    <dgm:sp3d/>
+    <dgm:txPr/>
+    <dgm:style>
+      <a:lnRef idx="2">
+        <a:scrgbClr r="0" g="0" b="0"/>
+      </a:lnRef>
+      <a:fillRef idx="1">
+        <a:scrgbClr r="0" g="0" b="0"/>
+      </a:fillRef>
+      <a:effectRef idx="0">
+        <a:scrgbClr r="0" g="0" b="0"/>
+      </a:effectRef>
+      <a:fontRef idx="minor">
+        <a:schemeClr val="lt1"/>
+      </a:fontRef>
+    </dgm:style>
+  </dgm:styleLbl>
+  <dgm:styleLbl name="parChTrans2D2">
+    <dgm:scene3d>
+      <a:camera prst="orthographicFront"/>
+      <a:lightRig rig="threePt" dir="t"/>
+    </dgm:scene3d>
+    <dgm:sp3d/>
+    <dgm:txPr/>
+    <dgm:style>
+      <a:lnRef idx="2">
+        <a:scrgbClr r="0" g="0" b="0"/>
+      </a:lnRef>
+      <a:fillRef idx="1">
+        <a:scrgbClr r="0" g="0" b="0"/>
+      </a:fillRef>
+      <a:effectRef idx="0">
+        <a:scrgbClr r="0" g="0" b="0"/>
+      </a:effectRef>
+      <a:fontRef idx="minor">
+        <a:schemeClr val="lt1"/>
+      </a:fontRef>
+    </dgm:style>
+  </dgm:styleLbl>
+  <dgm:styleLbl name="parChTrans2D3">
+    <dgm:scene3d>
+      <a:camera prst="orthographicFront"/>
+      <a:lightRig rig="threePt" dir="t"/>
+    </dgm:scene3d>
+    <dgm:sp3d/>
+    <dgm:txPr/>
+    <dgm:style>
+      <a:lnRef idx="2">
+        <a:scrgbClr r="0" g="0" b="0"/>
+      </a:lnRef>
+      <a:fillRef idx="1">
+        <a:scrgbClr r="0" g="0" b="0"/>
+      </a:fillRef>
+      <a:effectRef idx="0">
+        <a:scrgbClr r="0" g="0" b="0"/>
+      </a:effectRef>
+      <a:fontRef idx="minor">
+        <a:schemeClr val="lt1"/>
+      </a:fontRef>
+    </dgm:style>
+  </dgm:styleLbl>
+  <dgm:styleLbl name="parChTrans2D4">
+    <dgm:scene3d>
+      <a:camera prst="orthographicFront"/>
+      <a:lightRig rig="threePt" dir="t"/>
+    </dgm:scene3d>
+    <dgm:sp3d/>
+    <dgm:txPr/>
+    <dgm:style>
+      <a:lnRef idx="2">
+        <a:scrgbClr r="0" g="0" b="0"/>
+      </a:lnRef>
+      <a:fillRef idx="1">
+        <a:scrgbClr r="0" g="0" b="0"/>
+      </a:fillRef>
+      <a:effectRef idx="0">
+        <a:scrgbClr r="0" g="0" b="0"/>
+      </a:effectRef>
+      <a:fontRef idx="minor">
+        <a:schemeClr val="lt1"/>
+      </a:fontRef>
+    </dgm:style>
+  </dgm:styleLbl>
+  <dgm:styleLbl name="parChTrans1D1">
+    <dgm:scene3d>
+      <a:camera prst="orthographicFront"/>
+      <a:lightRig rig="threePt" dir="t"/>
+    </dgm:scene3d>
+    <dgm:sp3d/>
+    <dgm:txPr/>
+    <dgm:style>
+      <a:lnRef idx="2">
+        <a:scrgbClr r="0" g="0" b="0"/>
+      </a:lnRef>
+      <a:fillRef idx="0">
+        <a:scrgbClr r="0" g="0" b="0"/>
+      </a:fillRef>
+      <a:effectRef idx="0">
+        <a:scrgbClr r="0" g="0" b="0"/>
+      </a:effectRef>
+      <a:fontRef idx="minor"/>
+    </dgm:style>
+  </dgm:styleLbl>
+  <dgm:styleLbl name="parChTrans1D2">
+    <dgm:scene3d>
+      <a:camera prst="orthographicFront"/>
+      <a:lightRig rig="threePt" dir="t"/>
+    </dgm:scene3d>
+    <dgm:sp3d/>
+    <dgm:txPr/>
+    <dgm:style>
+      <a:lnRef idx="2">
+        <a:scrgbClr r="0" g="0" b="0"/>
+      </a:lnRef>
+      <a:fillRef idx="0">
+        <a:scrgbClr r="0" g="0" b="0"/>
+      </a:fillRef>
+      <a:effectRef idx="0">
+        <a:scrgbClr r="0" g="0" b="0"/>
+      </a:effectRef>
+      <a:fontRef idx="minor"/>
+    </dgm:style>
+  </dgm:styleLbl>
+  <dgm:styleLbl name="parChTrans1D3">
+    <dgm:scene3d>
+      <a:camera prst="orthographicFront"/>
+      <a:lightRig rig="threePt" dir="t"/>
+    </dgm:scene3d>
+    <dgm:sp3d/>
+    <dgm:txPr/>
+    <dgm:style>
+      <a:lnRef idx="2">
+        <a:scrgbClr r="0" g="0" b="0"/>
+      </a:lnRef>
+      <a:fillRef idx="0">
+        <a:scrgbClr r="0" g="0" b="0"/>
+      </a:fillRef>
+      <a:effectRef idx="0">
+        <a:scrgbClr r="0" g="0" b="0"/>
+      </a:effectRef>
+      <a:fontRef idx="minor"/>
+    </dgm:style>
+  </dgm:styleLbl>
+  <dgm:styleLbl name="parChTrans1D4">
+    <dgm:scene3d>
+      <a:camera prst="orthographicFront"/>
+      <a:lightRig rig="threePt" dir="t"/>
+    </dgm:scene3d>
+    <dgm:sp3d/>
+    <dgm:txPr/>
+    <dgm:style>
+      <a:lnRef idx="2">
+        <a:scrgbClr r="0" g="0" b="0"/>
+      </a:lnRef>
+      <a:fillRef idx="0">
+        <a:scrgbClr r="0" g="0" b="0"/>
+      </a:fillRef>
+      <a:effectRef idx="0">
+        <a:scrgbClr r="0" g="0" b="0"/>
+      </a:effectRef>
+      <a:fontRef idx="minor"/>
+    </dgm:style>
+  </dgm:styleLbl>
+  <dgm:styleLbl name="fgAcc1">
+    <dgm:scene3d>
+      <a:camera prst="orthographicFront"/>
+      <a:lightRig rig="threePt" dir="t"/>
+    </dgm:scene3d>
+    <dgm:sp3d/>
+    <dgm:txPr/>
+    <dgm:style>
+      <a:lnRef idx="2">
+        <a:scrgbClr r="0" g="0" b="0"/>
+      </a:lnRef>
+      <a:fillRef idx="1">
+        <a:scrgbClr r="0" g="0" b="0"/>
+      </a:fillRef>
+      <a:effectRef idx="0">
+        <a:scrgbClr r="0" g="0" b="0"/>
+      </a:effectRef>
+      <a:fontRef idx="minor"/>
+    </dgm:style>
+  </dgm:styleLbl>
+  <dgm:styleLbl name="conFgAcc1">
+    <dgm:scene3d>
+      <a:camera prst="orthographicFront"/>
+      <a:lightRig rig="threePt" dir="t"/>
+    </dgm:scene3d>
+    <dgm:sp3d/>
+    <dgm:txPr/>
+    <dgm:style>
+      <a:lnRef idx="2">
+        <a:scrgbClr r="0" g="0" b="0"/>
+      </a:lnRef>
+      <a:fillRef idx="1">
+        <a:scrgbClr r="0" g="0" b="0"/>
+      </a:fillRef>
+      <a:effectRef idx="0">
+        <a:scrgbClr r="0" g="0" b="0"/>
+      </a:effectRef>
+      <a:fontRef idx="minor"/>
+    </dgm:style>
+  </dgm:styleLbl>
+  <dgm:styleLbl name="alignAcc1">
+    <dgm:scene3d>
+      <a:camera prst="orthographicFront"/>
+      <a:lightRig rig="threePt" dir="t"/>
+    </dgm:scene3d>
+    <dgm:sp3d/>
+    <dgm:txPr/>
+    <dgm:style>
+      <a:lnRef idx="2">
+        <a:scrgbClr r="0" g="0" b="0"/>
+      </a:lnRef>
+      <a:fillRef idx="1">
+        <a:scrgbClr r="0" g="0" b="0"/>
+      </a:fillRef>
+      <a:effectRef idx="0">
+        <a:scrgbClr r="0" g="0" b="0"/>
+      </a:effectRef>
+      <a:fontRef idx="minor"/>
+    </dgm:style>
+  </dgm:styleLbl>
+  <dgm:styleLbl name="trAlignAcc1">
+    <dgm:scene3d>
+      <a:camera prst="orthographicFront"/>
+      <a:lightRig rig="threePt" dir="t"/>
+    </dgm:scene3d>
+    <dgm:sp3d/>
+    <dgm:txPr/>
+    <dgm:style>
+      <a:lnRef idx="1">
+        <a:scrgbClr r="0" g="0" b="0"/>
+      </a:lnRef>
+      <a:fillRef idx="1">
+        <a:scrgbClr r="0" g="0" b="0"/>
+      </a:fillRef>
+      <a:effectRef idx="0">
+        <a:scrgbClr r="0" g="0" b="0"/>
+      </a:effectRef>
+      <a:fontRef idx="minor"/>
+    </dgm:style>
+  </dgm:styleLbl>
+  <dgm:styleLbl name="bgAcc1">
+    <dgm:scene3d>
+      <a:camera prst="orthographicFront"/>
+      <a:lightRig rig="threePt" dir="t"/>
+    </dgm:scene3d>
+    <dgm:sp3d/>
+    <dgm:txPr/>
+    <dgm:style>
+      <a:lnRef idx="2">
+        <a:scrgbClr r="0" g="0" b="0"/>
+      </a:lnRef>
+      <a:fillRef idx="1">
+        <a:scrgbClr r="0" g="0" b="0"/>
+      </a:fillRef>
+      <a:effectRef idx="0">
+        <a:scrgbClr r="0" g="0" b="0"/>
+      </a:effectRef>
+      <a:fontRef idx="minor"/>
+    </dgm:style>
+  </dgm:styleLbl>
+  <dgm:styleLbl name="solidFgAcc1">
+    <dgm:scene3d>
+      <a:camera prst="orthographicFront"/>
+      <a:lightRig rig="threePt" dir="t"/>
+    </dgm:scene3d>
+    <dgm:sp3d/>
+    <dgm:txPr/>
+    <dgm:style>
+      <a:lnRef idx="2">
+        <a:scrgbClr r="0" g="0" b="0"/>
+      </a:lnRef>
+      <a:fillRef idx="1">
+        <a:scrgbClr r="0" g="0" b="0"/>
+      </a:fillRef>
+      <a:effectRef idx="0">
+        <a:scrgbClr r="0" g="0" b="0"/>
+      </a:effectRef>
+      <a:fontRef idx="minor"/>
+    </dgm:style>
+  </dgm:styleLbl>
+  <dgm:styleLbl name="solidAlignAcc1">
+    <dgm:scene3d>
+      <a:camera prst="orthographicFront"/>
+      <a:lightRig rig="threePt" dir="t"/>
+    </dgm:scene3d>
+    <dgm:sp3d/>
+    <dgm:txPr/>
+    <dgm:style>
+      <a:lnRef idx="2">
+        <a:scrgbClr r="0" g="0" b="0"/>
+      </a:lnRef>
+      <a:fillRef idx="1">
+        <a:scrgbClr r="0" g="0" b="0"/>
+      </a:fillRef>
+      <a:effectRef idx="0">
+        <a:scrgbClr r="0" g="0" b="0"/>
+      </a:effectRef>
+      <a:fontRef idx="minor"/>
+    </dgm:style>
+  </dgm:styleLbl>
+  <dgm:styleLbl name="solidBgAcc1">
+    <dgm:scene3d>
+      <a:camera prst="orthographicFront"/>
+      <a:lightRig rig="threePt" dir="t"/>
+    </dgm:scene3d>
+    <dgm:sp3d/>
+    <dgm:txPr/>
+    <dgm:style>
+      <a:lnRef idx="2">
+        <a:scrgbClr r="0" g="0" b="0"/>
+      </a:lnRef>
+      <a:fillRef idx="1">
+        <a:scrgbClr r="0" g="0" b="0"/>
+      </a:fillRef>
+      <a:effectRef idx="0">
+        <a:scrgbClr r="0" g="0" b="0"/>
+      </a:effectRef>
+      <a:fontRef idx="minor"/>
+    </dgm:style>
+  </dgm:styleLbl>
+  <dgm:styleLbl name="fgAccFollowNode1">
+    <dgm:scene3d>
+      <a:camera prst="orthographicFront"/>
+      <a:lightRig rig="threePt" dir="t"/>
+    </dgm:scene3d>
+    <dgm:sp3d/>
+    <dgm:txPr/>
+    <dgm:style>
+      <a:lnRef idx="2">
+        <a:scrgbClr r="0" g="0" b="0"/>
+      </a:lnRef>
+      <a:fillRef idx="1">
+        <a:scrgbClr r="0" g="0" b="0"/>
+      </a:fillRef>
+      <a:effectRef idx="0">
+        <a:scrgbClr r="0" g="0" b="0"/>
+      </a:effectRef>
+      <a:fontRef idx="minor"/>
+    </dgm:style>
+  </dgm:styleLbl>
+  <dgm:styleLbl name="alignAccFollowNode1">
+    <dgm:scene3d>
+      <a:camera prst="orthographicFront"/>
+      <a:lightRig rig="threePt" dir="t"/>
+    </dgm:scene3d>
+    <dgm:sp3d/>
+    <dgm:txPr/>
+    <dgm:style>
+      <a:lnRef idx="2">
+        <a:scrgbClr r="0" g="0" b="0"/>
+      </a:lnRef>
+      <a:fillRef idx="1">
+        <a:scrgbClr r="0" g="0" b="0"/>
+      </a:fillRef>
+      <a:effectRef idx="0">
+        <a:scrgbClr r="0" g="0" b="0"/>
+      </a:effectRef>
+      <a:fontRef idx="minor"/>
+    </dgm:style>
+  </dgm:styleLbl>
+  <dgm:styleLbl name="bgAccFollowNode1">
+    <dgm:scene3d>
+      <a:camera prst="orthographicFront"/>
+      <a:lightRig rig="threePt" dir="t"/>
+    </dgm:scene3d>
+    <dgm:sp3d/>
+    <dgm:txPr/>
+    <dgm:style>
+      <a:lnRef idx="2">
+        <a:scrgbClr r="0" g="0" b="0"/>
+      </a:lnRef>
+      <a:fillRef idx="1">
+        <a:scrgbClr r="0" g="0" b="0"/>
+      </a:fillRef>
+      <a:effectRef idx="0">
+        <a:scrgbClr r="0" g="0" b="0"/>
+      </a:effectRef>
+      <a:fontRef idx="minor"/>
+    </dgm:style>
+  </dgm:styleLbl>
+  <dgm:styleLbl name="fgAcc0">
+    <dgm:scene3d>
+      <a:camera prst="orthographicFront"/>
+      <a:lightRig rig="threePt" dir="t"/>
+    </dgm:scene3d>
+    <dgm:sp3d/>
+    <dgm:txPr/>
+    <dgm:style>
+      <a:lnRef idx="2">
+        <a:scrgbClr r="0" g="0" b="0"/>
+      </a:lnRef>
+      <a:fillRef idx="1">
+        <a:scrgbClr r="0" g="0" b="0"/>
+      </a:fillRef>
+      <a:effectRef idx="0">
+        <a:scrgbClr r="0" g="0" b="0"/>
+      </a:effectRef>
+      <a:fontRef idx="minor"/>
+    </dgm:style>
+  </dgm:styleLbl>
+  <dgm:styleLbl name="fgAcc2">
+    <dgm:scene3d>
+      <a:camera prst="orthographicFront"/>
+      <a:lightRig rig="threePt" dir="t"/>
+    </dgm:scene3d>
+    <dgm:sp3d/>
+    <dgm:txPr/>
+    <dgm:style>
+      <a:lnRef idx="2">
+        <a:scrgbClr r="0" g="0" b="0"/>
+      </a:lnRef>
+      <a:fillRef idx="1">
+        <a:scrgbClr r="0" g="0" b="0"/>
+      </a:fillRef>
+      <a:effectRef idx="0">
+        <a:scrgbClr r="0" g="0" b="0"/>
+      </a:effectRef>
+      <a:fontRef idx="minor"/>
+    </dgm:style>
+  </dgm:styleLbl>
+  <dgm:styleLbl name="fgAcc3">
+    <dgm:scene3d>
+      <a:camera prst="orthographicFront"/>
+      <a:lightRig rig="threePt" dir="t"/>
+    </dgm:scene3d>
+    <dgm:sp3d/>
+    <dgm:txPr/>
+    <dgm:style>
+      <a:lnRef idx="2">
+        <a:scrgbClr r="0" g="0" b="0"/>
+      </a:lnRef>
+      <a:fillRef idx="1">
+        <a:scrgbClr r="0" g="0" b="0"/>
+      </a:fillRef>
+      <a:effectRef idx="0">
+        <a:scrgbClr r="0" g="0" b="0"/>
+      </a:effectRef>
+      <a:fontRef idx="minor"/>
+    </dgm:style>
+  </dgm:styleLbl>
+  <dgm:styleLbl name="fgAcc4">
+    <dgm:scene3d>
+      <a:camera prst="orthographicFront"/>
+      <a:lightRig rig="threePt" dir="t"/>
+    </dgm:scene3d>
+    <dgm:sp3d/>
+    <dgm:txPr/>
+    <dgm:style>
+      <a:lnRef idx="2">
+        <a:scrgbClr r="0" g="0" b="0"/>
+      </a:lnRef>
+      <a:fillRef idx="1">
+        <a:scrgbClr r="0" g="0" b="0"/>
+      </a:fillRef>
+      <a:effectRef idx="0">
+        <a:scrgbClr r="0" g="0" b="0"/>
+      </a:effectRef>
+      <a:fontRef idx="minor"/>
+    </dgm:style>
+  </dgm:styleLbl>
+  <dgm:styleLbl name="bgShp">
+    <dgm:scene3d>
+      <a:camera prst="orthographicFront"/>
+      <a:lightRig rig="threePt" dir="t"/>
+    </dgm:scene3d>
+    <dgm:sp3d/>
+    <dgm:txPr/>
+    <dgm:style>
+      <a:lnRef idx="0">
+        <a:scrgbClr r="0" g="0" b="0"/>
+      </a:lnRef>
+      <a:fillRef idx="1">
+        <a:scrgbClr r="0" g="0" b="0"/>
+      </a:fillRef>
+      <a:effectRef idx="0">
+        <a:scrgbClr r="0" g="0" b="0"/>
+      </a:effectRef>
+      <a:fontRef idx="minor"/>
+    </dgm:style>
+  </dgm:styleLbl>
+  <dgm:styleLbl name="dkBgShp">
+    <dgm:scene3d>
+      <a:camera prst="orthographicFront"/>
+      <a:lightRig rig="threePt" dir="t"/>
+    </dgm:scene3d>
+    <dgm:sp3d/>
+    <dgm:txPr/>
+    <dgm:style>
+      <a:lnRef idx="0">
+        <a:scrgbClr r="0" g="0" b="0"/>
+      </a:lnRef>
+      <a:fillRef idx="1">
+        <a:scrgbClr r="0" g="0" b="0"/>
+      </a:fillRef>
+      <a:effectRef idx="0">
+        <a:scrgbClr r="0" g="0" b="0"/>
+      </a:effectRef>
+      <a:fontRef idx="minor"/>
+    </dgm:style>
+  </dgm:styleLbl>
+  <dgm:styleLbl name="trBgShp">
+    <dgm:scene3d>
+      <a:camera prst="orthographicFront"/>
+      <a:lightRig rig="threePt" dir="t"/>
+    </dgm:scene3d>
+    <dgm:sp3d/>
+    <dgm:txPr/>
+    <dgm:style>
+      <a:lnRef idx="0">
+        <a:scrgbClr r="0" g="0" b="0"/>
+      </a:lnRef>
+      <a:fillRef idx="1">
+        <a:scrgbClr r="0" g="0" b="0"/>
+      </a:fillRef>
+      <a:effectRef idx="0">
+        <a:scrgbClr r="0" g="0" b="0"/>
+      </a:effectRef>
+      <a:fontRef idx="minor"/>
+    </dgm:style>
+  </dgm:styleLbl>
+  <dgm:styleLbl name="fgShp">
+    <dgm:scene3d>
+      <a:camera prst="orthographicFront"/>
+      <a:lightRig rig="threePt" dir="t"/>
+    </dgm:scene3d>
+    <dgm:sp3d/>
+    <dgm:txPr/>
+    <dgm:style>
+      <a:lnRef idx="2">
+        <a:scrgbClr r="0" g="0" b="0"/>
+      </a:lnRef>
+      <a:fillRef idx="1">
+        <a:scrgbClr r="0" g="0" b="0"/>
+      </a:fillRef>
+      <a:effectRef idx="0">
+        <a:scrgbClr r="0" g="0" b="0"/>
+      </a:effectRef>
+      <a:fontRef idx="minor"/>
+    </dgm:style>
+  </dgm:styleLbl>
+  <dgm:styleLbl name="revTx">
+    <dgm:scene3d>
+      <a:camera prst="orthographicFront"/>
+      <a:lightRig rig="threePt" dir="t"/>
+    </dgm:scene3d>
+    <dgm:sp3d/>
+    <dgm:txPr/>
+    <dgm:style>
+      <a:lnRef idx="0">
+        <a:scrgbClr r="0" g="0" b="0"/>
+      </a:lnRef>
+      <a:fillRef idx="0">
+        <a:scrgbClr r="0" g="0" b="0"/>
+      </a:fillRef>
+      <a:effectRef idx="0">
+        <a:scrgbClr r="0" g="0" b="0"/>
+      </a:effectRef>
+      <a:fontRef idx="minor"/>
+    </dgm:style>
+  </dgm:styleLbl>
+</dgm:styleDef>
 </file>
 
 <file path=ppt/slideLayouts/slideLayout1.xml><?xml version="1.0" encoding="utf-8"?>
@@ -6158,8 +8649,8 @@
         </p:nvSpPr>
         <p:spPr>
           <a:xfrm>
-            <a:off x="3735386" y="1496482"/>
-            <a:ext cx="4721228" cy="2585323"/>
+            <a:off x="2974728" y="847017"/>
+            <a:ext cx="6242543" cy="4678204"/>
           </a:xfrm>
           <a:prstGeom prst="rect">
             <a:avLst/>
@@ -6174,7 +8665,7 @@
           <a:p>
             <a:pPr algn="ctr"/>
             <a:r>
-              <a:rPr lang="en-US" sz="5400" b="0" cap="none" spc="0" dirty="0">
+              <a:rPr lang="en-US" sz="7200" b="0" cap="none" spc="0" dirty="0">
                 <a:ln w="0"/>
                 <a:solidFill>
                   <a:schemeClr val="accent1"/>
@@ -6192,11 +8683,29 @@
           </a:p>
           <a:p>
             <a:pPr algn="ctr"/>
+            <a:endParaRPr lang="en-US" sz="2800" b="0" cap="none" spc="0" dirty="0">
+              <a:ln w="0"/>
+              <a:solidFill>
+                <a:schemeClr val="accent1"/>
+              </a:solidFill>
+              <a:effectLst>
+                <a:outerShdw blurRad="38100" dist="25400" dir="5400000" algn="ctr" rotWithShape="0">
+                  <a:srgbClr val="6E747A">
+                    <a:alpha val="43000"/>
+                  </a:srgbClr>
+                </a:outerShdw>
+              </a:effectLst>
+            </a:endParaRPr>
+          </a:p>
+          <a:p>
+            <a:pPr algn="ctr"/>
             <a:r>
               <a:rPr lang="en-US" sz="5400" dirty="0">
                 <a:ln w="0"/>
                 <a:solidFill>
-                  <a:schemeClr val="accent1"/>
+                  <a:schemeClr val="bg2">
+                    <a:lumMod val="50000"/>
+                  </a:schemeClr>
                 </a:solidFill>
                 <a:effectLst>
                   <a:outerShdw blurRad="38100" dist="25400" dir="5400000" algn="ctr" rotWithShape="0">
@@ -6215,7 +8724,9 @@
               <a:rPr lang="en-US" sz="5400" b="0" cap="none" spc="0" dirty="0">
                 <a:ln w="0"/>
                 <a:solidFill>
-                  <a:schemeClr val="accent1"/>
+                  <a:schemeClr val="bg2">
+                    <a:lumMod val="50000"/>
+                  </a:schemeClr>
                 </a:solidFill>
                 <a:effectLst>
                   <a:outerShdw blurRad="38100" dist="25400" dir="5400000" algn="ctr" rotWithShape="0">
@@ -6227,6 +8738,56 @@
               </a:rPr>
               <a:t>DEMO 3</a:t>
             </a:r>
+          </a:p>
+          <a:p>
+            <a:pPr algn="ctr"/>
+            <a:endParaRPr lang="en-US" sz="2400" b="0" cap="none" spc="0" dirty="0">
+              <a:ln w="0"/>
+              <a:solidFill>
+                <a:schemeClr val="bg2">
+                  <a:lumMod val="50000"/>
+                </a:schemeClr>
+              </a:solidFill>
+              <a:effectLst>
+                <a:outerShdw blurRad="38100" dist="25400" dir="5400000" algn="ctr" rotWithShape="0">
+                  <a:srgbClr val="6E747A">
+                    <a:alpha val="43000"/>
+                  </a:srgbClr>
+                </a:outerShdw>
+              </a:effectLst>
+            </a:endParaRPr>
+          </a:p>
+          <a:p>
+            <a:pPr algn="ctr"/>
+            <a:r>
+              <a:rPr lang="en-US" sz="6600" dirty="0">
+                <a:ln w="0"/>
+                <a:solidFill>
+                  <a:schemeClr val="accent1"/>
+                </a:solidFill>
+                <a:effectLst>
+                  <a:outerShdw blurRad="38100" dist="25400" dir="5400000" algn="ctr" rotWithShape="0">
+                    <a:srgbClr val="6E747A">
+                      <a:alpha val="43000"/>
+                    </a:srgbClr>
+                  </a:outerShdw>
+                </a:effectLst>
+              </a:rPr>
+              <a:t>LINK</a:t>
+            </a:r>
+            <a:endParaRPr lang="en-US" sz="6600" b="0" cap="none" spc="0" dirty="0">
+              <a:ln w="0"/>
+              <a:solidFill>
+                <a:schemeClr val="accent1"/>
+              </a:solidFill>
+              <a:effectLst>
+                <a:outerShdw blurRad="38100" dist="25400" dir="5400000" algn="ctr" rotWithShape="0">
+                  <a:srgbClr val="6E747A">
+                    <a:alpha val="43000"/>
+                  </a:srgbClr>
+                </a:outerShdw>
+              </a:effectLst>
+            </a:endParaRPr>
           </a:p>
         </p:txBody>
       </p:sp>
@@ -6256,7 +8817,7 @@
         </p:blipFill>
         <p:spPr>
           <a:xfrm>
-            <a:off x="5029200" y="4656215"/>
+            <a:off x="9906000" y="170742"/>
             <a:ext cx="2133600" cy="676275"/>
           </a:xfrm>
           <a:prstGeom prst="rect">
@@ -6290,7 +8851,7 @@
         </p:blipFill>
         <p:spPr>
           <a:xfrm>
-            <a:off x="4966335" y="170742"/>
+            <a:off x="9780270" y="5895681"/>
             <a:ext cx="2259330" cy="653415"/>
           </a:xfrm>
           <a:prstGeom prst="rect">
@@ -6328,133 +8889,6 @@
           <a:chExt cx="0" cy="0"/>
         </a:xfrm>
       </p:grpSpPr>
-      <p:sp>
-        <p:nvSpPr>
-          <p:cNvPr id="2" name="TextBox 1">
-            <a:extLst>
-              <a:ext uri="{FF2B5EF4-FFF2-40B4-BE49-F238E27FC236}">
-                <a16:creationId xmlns:a16="http://schemas.microsoft.com/office/drawing/2014/main" id="{155FBD6A-36C4-4E9C-83A4-381BCD280DFF}"/>
-              </a:ext>
-            </a:extLst>
-          </p:cNvPr>
-          <p:cNvSpPr txBox="1"/>
-          <p:nvPr/>
-        </p:nvSpPr>
-        <p:spPr>
-          <a:xfrm>
-            <a:off x="2307771" y="1988457"/>
-            <a:ext cx="8714886" cy="1754326"/>
-          </a:xfrm>
-          <a:prstGeom prst="rect">
-            <a:avLst/>
-          </a:prstGeom>
-          <a:noFill/>
-        </p:spPr>
-        <p:txBody>
-          <a:bodyPr wrap="none" rtlCol="0">
-            <a:spAutoFit/>
-          </a:bodyPr>
-          <a:lstStyle/>
-          <a:p>
-            <a:r>
-              <a:rPr lang="en-ZA" dirty="0"/>
-              <a:t>Login, greeting changes</a:t>
-            </a:r>
-          </a:p>
-          <a:p>
-            <a:r>
-              <a:rPr lang="en-ZA" dirty="0"/>
-              <a:t>Profile (display edit box and password box)</a:t>
-            </a:r>
-          </a:p>
-          <a:p>
-            <a:r>
-              <a:rPr lang="en-ZA" dirty="0"/>
-              <a:t>Employees (display pagination, search, add and edit, change office, password, dark mode)</a:t>
-            </a:r>
-          </a:p>
-          <a:p>
-            <a:r>
-              <a:rPr lang="en-ZA" dirty="0"/>
-              <a:t>Buildings (collapse, explain one, add and edit buildings, google maps)</a:t>
-            </a:r>
-          </a:p>
-          <a:p>
-            <a:endParaRPr lang="en-ZA" dirty="0"/>
-          </a:p>
-          <a:p>
-            <a:r>
-              <a:rPr lang="en-ZA" dirty="0"/>
-              <a:t>3 buildings, 5 employees per building</a:t>
-            </a:r>
-          </a:p>
-        </p:txBody>
-      </p:sp>
-    </p:spTree>
-    <p:extLst>
-      <p:ext uri="{BB962C8B-B14F-4D97-AF65-F5344CB8AC3E}">
-        <p14:creationId xmlns:p14="http://schemas.microsoft.com/office/powerpoint/2010/main" val="1921078224"/>
-      </p:ext>
-    </p:extLst>
-  </p:cSld>
-  <p:clrMapOvr>
-    <a:masterClrMapping/>
-  </p:clrMapOvr>
-</p:sld>
-</file>
-
-<file path=ppt/slides/slide11.xml><?xml version="1.0" encoding="utf-8"?>
-<p:sld xmlns:a="http://schemas.openxmlformats.org/drawingml/2006/main" xmlns:r="http://schemas.openxmlformats.org/officeDocument/2006/relationships" xmlns:p="http://schemas.openxmlformats.org/presentationml/2006/main">
-  <p:cSld>
-    <p:spTree>
-      <p:nvGrpSpPr>
-        <p:cNvPr id="1" name=""/>
-        <p:cNvGrpSpPr/>
-        <p:nvPr/>
-      </p:nvGrpSpPr>
-      <p:grpSpPr>
-        <a:xfrm>
-          <a:off x="0" y="0"/>
-          <a:ext cx="0" cy="0"/>
-          <a:chOff x="0" y="0"/>
-          <a:chExt cx="0" cy="0"/>
-        </a:xfrm>
-      </p:grpSpPr>
-      <p:sp>
-        <p:nvSpPr>
-          <p:cNvPr id="3" name="TextBox 2">
-            <a:extLst>
-              <a:ext uri="{FF2B5EF4-FFF2-40B4-BE49-F238E27FC236}">
-                <a16:creationId xmlns:a16="http://schemas.microsoft.com/office/drawing/2014/main" id="{699F15FA-EB87-4FED-A434-33156FC5328F}"/>
-              </a:ext>
-            </a:extLst>
-          </p:cNvPr>
-          <p:cNvSpPr txBox="1"/>
-          <p:nvPr/>
-        </p:nvSpPr>
-        <p:spPr>
-          <a:xfrm>
-            <a:off x="5517155" y="132521"/>
-            <a:ext cx="1157689" cy="369332"/>
-          </a:xfrm>
-          <a:prstGeom prst="rect">
-            <a:avLst/>
-          </a:prstGeom>
-          <a:noFill/>
-        </p:spPr>
-        <p:txBody>
-          <a:bodyPr wrap="none" rtlCol="0">
-            <a:spAutoFit/>
-          </a:bodyPr>
-          <a:lstStyle/>
-          <a:p>
-            <a:r>
-              <a:rPr lang="en-ZA" dirty="0"/>
-              <a:t>App demo</a:t>
-            </a:r>
-          </a:p>
-        </p:txBody>
-      </p:sp>
       <p:pic>
         <p:nvPicPr>
           <p:cNvPr id="4" name="Picture 10" descr="Related image">
@@ -6579,6 +9013,67 @@
           </a:prstGeom>
         </p:spPr>
       </p:pic>
+      <p:sp>
+        <p:nvSpPr>
+          <p:cNvPr id="6" name="Rectangle 5">
+            <a:extLst>
+              <a:ext uri="{FF2B5EF4-FFF2-40B4-BE49-F238E27FC236}">
+                <a16:creationId xmlns:a16="http://schemas.microsoft.com/office/drawing/2014/main" id="{C2FD3051-C683-435D-981F-8AFF8ED6DF4B}"/>
+              </a:ext>
+            </a:extLst>
+          </p:cNvPr>
+          <p:cNvSpPr/>
+          <p:nvPr/>
+        </p:nvSpPr>
+        <p:spPr>
+          <a:xfrm>
+            <a:off x="3425154" y="172370"/>
+            <a:ext cx="5341719" cy="830997"/>
+          </a:xfrm>
+          <a:prstGeom prst="rect">
+            <a:avLst/>
+          </a:prstGeom>
+          <a:noFill/>
+        </p:spPr>
+        <p:txBody>
+          <a:bodyPr wrap="none" lIns="91440" tIns="45720" rIns="91440" bIns="45720">
+            <a:spAutoFit/>
+          </a:bodyPr>
+          <a:lstStyle/>
+          <a:p>
+            <a:pPr algn="ctr"/>
+            <a:r>
+              <a:rPr lang="en-US" sz="4800" dirty="0">
+                <a:ln w="0"/>
+                <a:solidFill>
+                  <a:schemeClr val="accent1"/>
+                </a:solidFill>
+                <a:effectLst>
+                  <a:outerShdw blurRad="38100" dist="25400" dir="5400000" algn="ctr" rotWithShape="0">
+                    <a:srgbClr val="6E747A">
+                      <a:alpha val="43000"/>
+                    </a:srgbClr>
+                  </a:outerShdw>
+                </a:effectLst>
+              </a:rPr>
+              <a:t>MOBILE APP DEMO</a:t>
+            </a:r>
+            <a:endParaRPr lang="en-US" sz="4800" b="0" cap="none" spc="0" dirty="0">
+              <a:ln w="0"/>
+              <a:solidFill>
+                <a:schemeClr val="accent1"/>
+              </a:solidFill>
+              <a:effectLst>
+                <a:outerShdw blurRad="38100" dist="25400" dir="5400000" algn="ctr" rotWithShape="0">
+                  <a:srgbClr val="6E747A">
+                    <a:alpha val="43000"/>
+                  </a:srgbClr>
+                </a:outerShdw>
+              </a:effectLst>
+            </a:endParaRPr>
+          </a:p>
+        </p:txBody>
+      </p:sp>
     </p:spTree>
     <p:extLst>
       <p:ext uri="{BB962C8B-B14F-4D97-AF65-F5344CB8AC3E}">
@@ -6592,7 +9087,7 @@
 </p:sld>
 </file>
 
-<file path=ppt/slides/slide12.xml><?xml version="1.0" encoding="utf-8"?>
+<file path=ppt/slides/slide11.xml><?xml version="1.0" encoding="utf-8"?>
 <p:sld xmlns:a="http://schemas.openxmlformats.org/drawingml/2006/main" xmlns:r="http://schemas.openxmlformats.org/officeDocument/2006/relationships" xmlns:p="http://schemas.openxmlformats.org/presentationml/2006/main">
   <p:cSld>
     <p:spTree>
@@ -6611,20 +9106,20 @@
       </p:grpSpPr>
       <p:sp>
         <p:nvSpPr>
-          <p:cNvPr id="2" name="TextBox 1">
+          <p:cNvPr id="3" name="Rectangle 2">
             <a:extLst>
               <a:ext uri="{FF2B5EF4-FFF2-40B4-BE49-F238E27FC236}">
-                <a16:creationId xmlns:a16="http://schemas.microsoft.com/office/drawing/2014/main" id="{F01C3869-EA41-430A-818E-12C50B6C5241}"/>
+                <a16:creationId xmlns:a16="http://schemas.microsoft.com/office/drawing/2014/main" id="{6A251EF9-7627-4E02-9980-D4B146466DD2}"/>
               </a:ext>
             </a:extLst>
           </p:cNvPr>
-          <p:cNvSpPr txBox="1"/>
+          <p:cNvSpPr/>
           <p:nvPr/>
         </p:nvSpPr>
         <p:spPr>
           <a:xfrm>
-            <a:off x="5043372" y="304799"/>
-            <a:ext cx="2105256" cy="369332"/>
+            <a:off x="3592366" y="2609556"/>
+            <a:ext cx="5007268" cy="1200329"/>
           </a:xfrm>
           <a:prstGeom prst="rect">
             <a:avLst/>
@@ -6632,160 +9127,112 @@
           <a:noFill/>
         </p:spPr>
         <p:txBody>
-          <a:bodyPr wrap="none" rtlCol="0">
+          <a:bodyPr wrap="none" lIns="91440" tIns="45720" rIns="91440" bIns="45720">
             <a:spAutoFit/>
           </a:bodyPr>
           <a:lstStyle/>
           <a:p>
-            <a:r>
-              <a:rPr lang="en-ZA" dirty="0"/>
-              <a:t>Flashy (</a:t>
-            </a:r>
-            <a:r>
-              <a:rPr lang="en-ZA" dirty="0" err="1"/>
-              <a:t>wifi</a:t>
-            </a:r>
-            <a:r>
-              <a:rPr lang="en-ZA" dirty="0"/>
-              <a:t> connect)</a:t>
-            </a:r>
+            <a:pPr algn="ctr"/>
+            <a:r>
+              <a:rPr lang="en-US" sz="7200" b="0" cap="none" spc="0" dirty="0">
+                <a:ln w="0"/>
+                <a:solidFill>
+                  <a:schemeClr val="accent1"/>
+                </a:solidFill>
+                <a:effectLst>
+                  <a:outerShdw blurRad="38100" dist="25400" dir="5400000" algn="ctr" rotWithShape="0">
+                    <a:srgbClr val="6E747A">
+                      <a:alpha val="43000"/>
+                    </a:srgbClr>
+                  </a:outerShdw>
+                </a:effectLst>
+              </a:rPr>
+              <a:t>THANK YOU</a:t>
+            </a:r>
+            <a:endParaRPr lang="en-US" sz="6600" b="0" cap="none" spc="0" dirty="0">
+              <a:ln w="0"/>
+              <a:solidFill>
+                <a:schemeClr val="accent1"/>
+              </a:solidFill>
+              <a:effectLst>
+                <a:outerShdw blurRad="38100" dist="25400" dir="5400000" algn="ctr" rotWithShape="0">
+                  <a:srgbClr val="6E747A">
+                    <a:alpha val="43000"/>
+                  </a:srgbClr>
+                </a:outerShdw>
+              </a:effectLst>
+            </a:endParaRPr>
           </a:p>
         </p:txBody>
       </p:sp>
-      <p:sp>
-        <p:nvSpPr>
-          <p:cNvPr id="3" name="TextBox 2">
+      <p:pic>
+        <p:nvPicPr>
+          <p:cNvPr id="4" name="Picture 3">
             <a:extLst>
               <a:ext uri="{FF2B5EF4-FFF2-40B4-BE49-F238E27FC236}">
-                <a16:creationId xmlns:a16="http://schemas.microsoft.com/office/drawing/2014/main" id="{074CCDD5-4455-4319-BC8D-08F7372A4AE9}"/>
+                <a16:creationId xmlns:a16="http://schemas.microsoft.com/office/drawing/2014/main" id="{E80C0C6D-1950-45C9-BA8E-78442C98B8A6}"/>
               </a:ext>
             </a:extLst>
           </p:cNvPr>
-          <p:cNvSpPr txBox="1"/>
+          <p:cNvPicPr/>
           <p:nvPr/>
-        </p:nvSpPr>
+        </p:nvPicPr>
+        <p:blipFill>
+          <a:blip r:embed="rId2" cstate="print">
+            <a:extLst>
+              <a:ext uri="{28A0092B-C50C-407E-A947-70E740481C1C}">
+                <a14:useLocalDpi xmlns:a14="http://schemas.microsoft.com/office/drawing/2010/main" val="0"/>
+              </a:ext>
+            </a:extLst>
+          </a:blip>
+          <a:stretch>
+            <a:fillRect/>
+          </a:stretch>
+        </p:blipFill>
         <p:spPr>
           <a:xfrm>
-            <a:off x="4368800" y="1712686"/>
-            <a:ext cx="3036409" cy="1754326"/>
+            <a:off x="9906000" y="170742"/>
+            <a:ext cx="2133600" cy="676275"/>
           </a:xfrm>
           <a:prstGeom prst="rect">
             <a:avLst/>
           </a:prstGeom>
-          <a:noFill/>
         </p:spPr>
-        <p:txBody>
-          <a:bodyPr wrap="none" rtlCol="0">
-            <a:spAutoFit/>
-          </a:bodyPr>
-          <a:lstStyle/>
-          <a:p>
-            <a:r>
-              <a:rPr lang="en-ZA" dirty="0"/>
-              <a:t>Login</a:t>
-            </a:r>
-          </a:p>
-          <a:p>
-            <a:r>
-              <a:rPr lang="en-ZA" dirty="0"/>
-              <a:t>Show preloaded package</a:t>
-            </a:r>
-          </a:p>
-          <a:p>
-            <a:r>
-              <a:rPr lang="en-ZA" dirty="0"/>
-              <a:t>Create visitor package + share</a:t>
-            </a:r>
-          </a:p>
-          <a:p>
-            <a:r>
-              <a:rPr lang="en-ZA" dirty="0"/>
-              <a:t>Delete visitor package</a:t>
-            </a:r>
-          </a:p>
-          <a:p>
-            <a:r>
-              <a:rPr lang="en-ZA" dirty="0"/>
-              <a:t>Google Maps go</a:t>
-            </a:r>
-          </a:p>
-          <a:p>
-            <a:r>
-              <a:rPr lang="en-ZA" dirty="0" err="1"/>
-              <a:t>Wifi</a:t>
-            </a:r>
-            <a:r>
-              <a:rPr lang="en-ZA" dirty="0"/>
-              <a:t> connect</a:t>
-            </a:r>
-          </a:p>
-        </p:txBody>
-      </p:sp>
-    </p:spTree>
-    <p:extLst>
-      <p:ext uri="{BB962C8B-B14F-4D97-AF65-F5344CB8AC3E}">
-        <p14:creationId xmlns:p14="http://schemas.microsoft.com/office/powerpoint/2010/main" val="468354251"/>
-      </p:ext>
-    </p:extLst>
-  </p:cSld>
-  <p:clrMapOvr>
-    <a:masterClrMapping/>
-  </p:clrMapOvr>
-</p:sld>
-</file>
-
-<file path=ppt/slides/slide13.xml><?xml version="1.0" encoding="utf-8"?>
-<p:sld xmlns:a="http://schemas.openxmlformats.org/drawingml/2006/main" xmlns:r="http://schemas.openxmlformats.org/officeDocument/2006/relationships" xmlns:p="http://schemas.openxmlformats.org/presentationml/2006/main">
-  <p:cSld>
-    <p:spTree>
-      <p:nvGrpSpPr>
-        <p:cNvPr id="1" name=""/>
-        <p:cNvGrpSpPr/>
-        <p:nvPr/>
-      </p:nvGrpSpPr>
-      <p:grpSpPr>
-        <a:xfrm>
-          <a:off x="0" y="0"/>
-          <a:ext cx="0" cy="0"/>
-          <a:chOff x="0" y="0"/>
-          <a:chExt cx="0" cy="0"/>
-        </a:xfrm>
-      </p:grpSpPr>
-      <p:sp>
-        <p:nvSpPr>
-          <p:cNvPr id="2" name="TextBox 1">
+      </p:pic>
+      <p:pic>
+        <p:nvPicPr>
+          <p:cNvPr id="5" name="Picture 4" descr="A picture containing object&#10;&#10;Description automatically generated">
             <a:extLst>
               <a:ext uri="{FF2B5EF4-FFF2-40B4-BE49-F238E27FC236}">
-                <a16:creationId xmlns:a16="http://schemas.microsoft.com/office/drawing/2014/main" id="{E98F1501-248E-4D91-96AA-DA73EE00E2D1}"/>
+                <a16:creationId xmlns:a16="http://schemas.microsoft.com/office/drawing/2014/main" id="{45201310-080E-4EDA-BFF6-F08CD58DC5F2}"/>
               </a:ext>
             </a:extLst>
           </p:cNvPr>
-          <p:cNvSpPr txBox="1"/>
+          <p:cNvPicPr/>
           <p:nvPr/>
-        </p:nvSpPr>
+        </p:nvPicPr>
+        <p:blipFill>
+          <a:blip r:embed="rId3" cstate="print">
+            <a:extLst>
+              <a:ext uri="{28A0092B-C50C-407E-A947-70E740481C1C}">
+                <a14:useLocalDpi xmlns:a14="http://schemas.microsoft.com/office/drawing/2010/main" val="0"/>
+              </a:ext>
+            </a:extLst>
+          </a:blip>
+          <a:stretch>
+            <a:fillRect/>
+          </a:stretch>
+        </p:blipFill>
         <p:spPr>
           <a:xfrm>
-            <a:off x="5711687" y="2372139"/>
-            <a:ext cx="2621230" cy="769441"/>
+            <a:off x="9780270" y="5895681"/>
+            <a:ext cx="2259330" cy="653415"/>
           </a:xfrm>
           <a:prstGeom prst="rect">
             <a:avLst/>
           </a:prstGeom>
-          <a:noFill/>
         </p:spPr>
-        <p:txBody>
-          <a:bodyPr wrap="none" rtlCol="0">
-            <a:spAutoFit/>
-          </a:bodyPr>
-          <a:lstStyle/>
-          <a:p>
-            <a:r>
-              <a:rPr lang="en-ZA" sz="4400" dirty="0"/>
-              <a:t>Thank you</a:t>
-            </a:r>
-          </a:p>
-        </p:txBody>
-      </p:sp>
+      </p:pic>
     </p:spTree>
     <p:extLst>
       <p:ext uri="{BB962C8B-B14F-4D97-AF65-F5344CB8AC3E}">
@@ -6818,20 +9265,20 @@
       </p:grpSpPr>
       <p:sp>
         <p:nvSpPr>
-          <p:cNvPr id="2" name="TextBox 1">
+          <p:cNvPr id="3" name="Rectangle 2">
             <a:extLst>
               <a:ext uri="{FF2B5EF4-FFF2-40B4-BE49-F238E27FC236}">
-                <a16:creationId xmlns:a16="http://schemas.microsoft.com/office/drawing/2014/main" id="{10819BB9-6A2B-49FD-A254-2E2C4D48F0ED}"/>
+                <a16:creationId xmlns:a16="http://schemas.microsoft.com/office/drawing/2014/main" id="{FFC3437D-43E8-4CB5-A2AA-6010EC8DAF71}"/>
               </a:ext>
             </a:extLst>
           </p:cNvPr>
-          <p:cNvSpPr txBox="1"/>
+          <p:cNvSpPr/>
           <p:nvPr/>
         </p:nvSpPr>
         <p:spPr>
           <a:xfrm>
-            <a:off x="3306100" y="1602251"/>
-            <a:ext cx="4662241" cy="2308324"/>
+            <a:off x="3903348" y="106016"/>
+            <a:ext cx="4385303" cy="923330"/>
           </a:xfrm>
           <a:prstGeom prst="rect">
             <a:avLst/>
@@ -6839,61 +9286,59 @@
           <a:noFill/>
         </p:spPr>
         <p:txBody>
-          <a:bodyPr wrap="square" rtlCol="0">
+          <a:bodyPr wrap="none" lIns="91440" tIns="45720" rIns="91440" bIns="45720">
             <a:spAutoFit/>
           </a:bodyPr>
           <a:lstStyle/>
           <a:p>
-            <a:r>
-              <a:rPr lang="en-ZA" sz="2400" dirty="0"/>
-              <a:t>In this demo, we will cover:</a:t>
-            </a:r>
-          </a:p>
-          <a:p>
-            <a:endParaRPr lang="en-ZA" sz="2400" dirty="0"/>
-          </a:p>
-          <a:p>
-            <a:pPr marL="342900" indent="-342900">
-              <a:buFont typeface="Arial" panose="020B0604020202020204" pitchFamily="34" charset="0"/>
-              <a:buChar char="•"/>
-            </a:pPr>
-            <a:r>
-              <a:rPr lang="en-ZA" sz="2400" dirty="0"/>
-              <a:t>Use cases done</a:t>
-            </a:r>
-          </a:p>
-          <a:p>
-            <a:pPr marL="342900" indent="-342900">
-              <a:buFont typeface="Arial" panose="020B0604020202020204" pitchFamily="34" charset="0"/>
-              <a:buChar char="•"/>
-            </a:pPr>
-            <a:r>
-              <a:rPr lang="en-ZA" sz="2400" dirty="0"/>
-              <a:t>Integration and unit testing</a:t>
-            </a:r>
-          </a:p>
-          <a:p>
-            <a:pPr marL="342900" indent="-342900">
-              <a:buFont typeface="Arial" panose="020B0604020202020204" pitchFamily="34" charset="0"/>
-              <a:buChar char="•"/>
-            </a:pPr>
-            <a:r>
-              <a:rPr lang="en-ZA" sz="2400" dirty="0"/>
-              <a:t>Demo our admin interface</a:t>
-            </a:r>
-          </a:p>
-          <a:p>
-            <a:pPr marL="342900" indent="-342900">
-              <a:buFont typeface="Arial" panose="020B0604020202020204" pitchFamily="34" charset="0"/>
-              <a:buChar char="•"/>
-            </a:pPr>
-            <a:r>
-              <a:rPr lang="en-ZA" sz="2400" dirty="0"/>
-              <a:t>Demo our mobile app</a:t>
+            <a:pPr algn="ctr"/>
+            <a:r>
+              <a:rPr lang="en-US" sz="5400" b="0" cap="none" spc="0" dirty="0">
+                <a:ln w="0"/>
+                <a:solidFill>
+                  <a:schemeClr val="accent1"/>
+                </a:solidFill>
+                <a:effectLst>
+                  <a:outerShdw blurRad="38100" dist="25400" dir="5400000" algn="ctr" rotWithShape="0">
+                    <a:srgbClr val="6E747A">
+                      <a:alpha val="43000"/>
+                    </a:srgbClr>
+                  </a:outerShdw>
+                </a:effectLst>
+              </a:rPr>
+              <a:t>IN THIS DEMO</a:t>
             </a:r>
           </a:p>
         </p:txBody>
       </p:sp>
+      <p:graphicFrame>
+        <p:nvGraphicFramePr>
+          <p:cNvPr id="4" name="Diagram 3">
+            <a:extLst>
+              <a:ext uri="{FF2B5EF4-FFF2-40B4-BE49-F238E27FC236}">
+                <a16:creationId xmlns:a16="http://schemas.microsoft.com/office/drawing/2014/main" id="{A8E94088-C290-422D-A3E4-59AED9CB643D}"/>
+              </a:ext>
+            </a:extLst>
+          </p:cNvPr>
+          <p:cNvGraphicFramePr/>
+          <p:nvPr>
+            <p:extLst>
+              <p:ext uri="{D42A27DB-BD31-4B8C-83A1-F6EECF244321}">
+                <p14:modId xmlns:p14="http://schemas.microsoft.com/office/powerpoint/2010/main" val="3565295334"/>
+              </p:ext>
+            </p:extLst>
+          </p:nvPr>
+        </p:nvGraphicFramePr>
+        <p:xfrm>
+          <a:off x="3461025" y="1390189"/>
+          <a:ext cx="5269948" cy="4077621"/>
+        </p:xfrm>
+        <a:graphic>
+          <a:graphicData uri="http://schemas.openxmlformats.org/drawingml/2006/diagram">
+            <dgm:relIds xmlns:dgm="http://schemas.openxmlformats.org/drawingml/2006/diagram" xmlns:r="http://schemas.openxmlformats.org/officeDocument/2006/relationships" r:dm="rId2" r:lo="rId3" r:qs="rId4" r:cs="rId5"/>
+          </a:graphicData>
+        </a:graphic>
+      </p:graphicFrame>
     </p:spTree>
     <p:extLst>
       <p:ext uri="{BB962C8B-B14F-4D97-AF65-F5344CB8AC3E}">
@@ -6926,20 +9371,20 @@
       </p:grpSpPr>
       <p:sp>
         <p:nvSpPr>
-          <p:cNvPr id="2" name="TextBox 1">
+          <p:cNvPr id="3" name="Rectangle 2">
             <a:extLst>
               <a:ext uri="{FF2B5EF4-FFF2-40B4-BE49-F238E27FC236}">
-                <a16:creationId xmlns:a16="http://schemas.microsoft.com/office/drawing/2014/main" id="{EB3CA44A-C28B-48E5-A9FE-3BE36361758E}"/>
+                <a16:creationId xmlns:a16="http://schemas.microsoft.com/office/drawing/2014/main" id="{6C48296A-9899-4049-AA3D-84FB5F5ECC98}"/>
               </a:ext>
             </a:extLst>
           </p:cNvPr>
-          <p:cNvSpPr txBox="1"/>
+          <p:cNvSpPr/>
           <p:nvPr/>
         </p:nvSpPr>
         <p:spPr>
           <a:xfrm>
-            <a:off x="5181600" y="1683657"/>
-            <a:ext cx="3248005" cy="2308324"/>
+            <a:off x="4338050" y="79512"/>
+            <a:ext cx="3515899" cy="923330"/>
           </a:xfrm>
           <a:prstGeom prst="rect">
             <a:avLst/>
@@ -6947,36 +9392,348 @@
           <a:noFill/>
         </p:spPr>
         <p:txBody>
-          <a:bodyPr wrap="none" rtlCol="0">
+          <a:bodyPr wrap="none" lIns="91440" tIns="45720" rIns="91440" bIns="45720">
             <a:spAutoFit/>
           </a:bodyPr>
           <a:lstStyle/>
           <a:p>
-            <a:r>
-              <a:rPr lang="en-ZA" sz="3600" dirty="0">
-                <a:highlight>
-                  <a:srgbClr val="00FFFF"/>
-                </a:highlight>
+            <a:pPr algn="ctr"/>
+            <a:r>
+              <a:rPr lang="en-US" sz="5400" dirty="0">
+                <a:ln w="0"/>
+                <a:solidFill>
+                  <a:schemeClr val="accent1"/>
+                </a:solidFill>
+                <a:effectLst>
+                  <a:outerShdw blurRad="38100" dist="25400" dir="5400000" algn="ctr" rotWithShape="0">
+                    <a:srgbClr val="6E747A">
+                      <a:alpha val="43000"/>
+                    </a:srgbClr>
+                  </a:outerShdw>
+                </a:effectLst>
               </a:rPr>
-              <a:t>Done in Demo 2</a:t>
-            </a:r>
-          </a:p>
-          <a:p>
-            <a:r>
-              <a:rPr lang="en-ZA" sz="3600" dirty="0"/>
-              <a:t>Done</a:t>
-            </a:r>
-          </a:p>
-          <a:p>
-            <a:r>
-              <a:rPr lang="en-ZA" sz="3600" dirty="0"/>
-              <a:t>In development</a:t>
-            </a:r>
-          </a:p>
-          <a:p>
-            <a:r>
-              <a:rPr lang="en-ZA" sz="3600" dirty="0"/>
-              <a:t>Not done</a:t>
+              <a:t>USE CASES</a:t>
+            </a:r>
+            <a:endParaRPr lang="en-US" sz="5400" b="0" cap="none" spc="0" dirty="0">
+              <a:ln w="0"/>
+              <a:solidFill>
+                <a:schemeClr val="accent1"/>
+              </a:solidFill>
+              <a:effectLst>
+                <a:outerShdw blurRad="38100" dist="25400" dir="5400000" algn="ctr" rotWithShape="0">
+                  <a:srgbClr val="6E747A">
+                    <a:alpha val="43000"/>
+                  </a:srgbClr>
+                </a:outerShdw>
+              </a:effectLst>
+            </a:endParaRPr>
+          </a:p>
+        </p:txBody>
+      </p:sp>
+      <p:graphicFrame>
+        <p:nvGraphicFramePr>
+          <p:cNvPr id="4" name="Table 3">
+            <a:extLst>
+              <a:ext uri="{FF2B5EF4-FFF2-40B4-BE49-F238E27FC236}">
+                <a16:creationId xmlns:a16="http://schemas.microsoft.com/office/drawing/2014/main" id="{DF9646A0-EB30-4825-AAA9-16840A66DD8D}"/>
+              </a:ext>
+            </a:extLst>
+          </p:cNvPr>
+          <p:cNvGraphicFramePr>
+            <a:graphicFrameLocks noGrp="1"/>
+          </p:cNvGraphicFramePr>
+          <p:nvPr>
+            <p:extLst>
+              <p:ext uri="{D42A27DB-BD31-4B8C-83A1-F6EECF244321}">
+                <p14:modId xmlns:p14="http://schemas.microsoft.com/office/powerpoint/2010/main" val="2266921857"/>
+              </p:ext>
+            </p:extLst>
+          </p:nvPr>
+        </p:nvGraphicFramePr>
+        <p:xfrm>
+          <a:off x="2031999" y="2501900"/>
+          <a:ext cx="8128000" cy="1854200"/>
+        </p:xfrm>
+        <a:graphic>
+          <a:graphicData uri="http://schemas.openxmlformats.org/drawingml/2006/table">
+            <a:tbl>
+              <a:tblPr firstRow="1" bandRow="1">
+                <a:tableStyleId>{5C22544A-7EE6-4342-B048-85BDC9FD1C3A}</a:tableStyleId>
+              </a:tblPr>
+              <a:tblGrid>
+                <a:gridCol w="4064000">
+                  <a:extLst>
+                    <a:ext uri="{9D8B030D-6E8A-4147-A177-3AD203B41FA5}">
+                      <a16:colId xmlns:a16="http://schemas.microsoft.com/office/drawing/2014/main" val="1433497461"/>
+                    </a:ext>
+                  </a:extLst>
+                </a:gridCol>
+                <a:gridCol w="4064000">
+                  <a:extLst>
+                    <a:ext uri="{9D8B030D-6E8A-4147-A177-3AD203B41FA5}">
+                      <a16:colId xmlns:a16="http://schemas.microsoft.com/office/drawing/2014/main" val="2247446505"/>
+                    </a:ext>
+                  </a:extLst>
+                </a:gridCol>
+              </a:tblGrid>
+              <a:tr h="370840">
+                <a:tc>
+                  <a:txBody>
+                    <a:bodyPr/>
+                    <a:lstStyle/>
+                    <a:p>
+                      <a:r>
+                        <a:rPr lang="en-ZA" dirty="0"/>
+                        <a:t>Colour</a:t>
+                      </a:r>
+                    </a:p>
+                  </a:txBody>
+                  <a:tcPr/>
+                </a:tc>
+                <a:tc>
+                  <a:txBody>
+                    <a:bodyPr/>
+                    <a:lstStyle/>
+                    <a:p>
+                      <a:r>
+                        <a:rPr lang="en-ZA" dirty="0"/>
+                        <a:t>Status</a:t>
+                      </a:r>
+                    </a:p>
+                  </a:txBody>
+                  <a:tcPr/>
+                </a:tc>
+                <a:extLst>
+                  <a:ext uri="{0D108BD9-81ED-4DB2-BD59-A6C34878D82A}">
+                    <a16:rowId xmlns:a16="http://schemas.microsoft.com/office/drawing/2014/main" val="4288003741"/>
+                  </a:ext>
+                </a:extLst>
+              </a:tr>
+              <a:tr h="370840">
+                <a:tc>
+                  <a:txBody>
+                    <a:bodyPr/>
+                    <a:lstStyle/>
+                    <a:p>
+                      <a:r>
+                        <a:rPr lang="en-ZA" dirty="0">
+                          <a:highlight>
+                            <a:srgbClr val="00FFFF"/>
+                          </a:highlight>
+                        </a:rPr>
+                        <a:t>Blue</a:t>
+                      </a:r>
+                    </a:p>
+                  </a:txBody>
+                  <a:tcPr/>
+                </a:tc>
+                <a:tc>
+                  <a:txBody>
+                    <a:bodyPr/>
+                    <a:lstStyle/>
+                    <a:p>
+                      <a:r>
+                        <a:rPr lang="en-ZA" dirty="0">
+                          <a:highlight>
+                            <a:srgbClr val="00FFFF"/>
+                          </a:highlight>
+                        </a:rPr>
+                        <a:t>Done by Demo 2</a:t>
+                      </a:r>
+                    </a:p>
+                  </a:txBody>
+                  <a:tcPr/>
+                </a:tc>
+                <a:extLst>
+                  <a:ext uri="{0D108BD9-81ED-4DB2-BD59-A6C34878D82A}">
+                    <a16:rowId xmlns:a16="http://schemas.microsoft.com/office/drawing/2014/main" val="2849420445"/>
+                  </a:ext>
+                </a:extLst>
+              </a:tr>
+              <a:tr h="370840">
+                <a:tc>
+                  <a:txBody>
+                    <a:bodyPr/>
+                    <a:lstStyle/>
+                    <a:p>
+                      <a:r>
+                        <a:rPr lang="en-ZA" dirty="0">
+                          <a:solidFill>
+                            <a:schemeClr val="tx1"/>
+                          </a:solidFill>
+                          <a:highlight>
+                            <a:srgbClr val="00FF00"/>
+                          </a:highlight>
+                        </a:rPr>
+                        <a:t>Green</a:t>
+                      </a:r>
+                    </a:p>
+                  </a:txBody>
+                  <a:tcPr/>
+                </a:tc>
+                <a:tc>
+                  <a:txBody>
+                    <a:bodyPr/>
+                    <a:lstStyle/>
+                    <a:p>
+                      <a:r>
+                        <a:rPr lang="en-ZA" dirty="0">
+                          <a:solidFill>
+                            <a:schemeClr val="tx1"/>
+                          </a:solidFill>
+                          <a:highlight>
+                            <a:srgbClr val="00FF00"/>
+                          </a:highlight>
+                        </a:rPr>
+                        <a:t>Done</a:t>
+                      </a:r>
+                    </a:p>
+                  </a:txBody>
+                  <a:tcPr/>
+                </a:tc>
+                <a:extLst>
+                  <a:ext uri="{0D108BD9-81ED-4DB2-BD59-A6C34878D82A}">
+                    <a16:rowId xmlns:a16="http://schemas.microsoft.com/office/drawing/2014/main" val="2615799098"/>
+                  </a:ext>
+                </a:extLst>
+              </a:tr>
+              <a:tr h="370840">
+                <a:tc>
+                  <a:txBody>
+                    <a:bodyPr/>
+                    <a:lstStyle/>
+                    <a:p>
+                      <a:r>
+                        <a:rPr lang="en-ZA" dirty="0">
+                          <a:highlight>
+                            <a:srgbClr val="FFFF00"/>
+                          </a:highlight>
+                        </a:rPr>
+                        <a:t>Yellow</a:t>
+                      </a:r>
+                    </a:p>
+                  </a:txBody>
+                  <a:tcPr/>
+                </a:tc>
+                <a:tc>
+                  <a:txBody>
+                    <a:bodyPr/>
+                    <a:lstStyle/>
+                    <a:p>
+                      <a:r>
+                        <a:rPr lang="en-ZA" dirty="0">
+                          <a:highlight>
+                            <a:srgbClr val="FFFF00"/>
+                          </a:highlight>
+                        </a:rPr>
+                        <a:t>In development</a:t>
+                      </a:r>
+                    </a:p>
+                  </a:txBody>
+                  <a:tcPr/>
+                </a:tc>
+                <a:extLst>
+                  <a:ext uri="{0D108BD9-81ED-4DB2-BD59-A6C34878D82A}">
+                    <a16:rowId xmlns:a16="http://schemas.microsoft.com/office/drawing/2014/main" val="3277666274"/>
+                  </a:ext>
+                </a:extLst>
+              </a:tr>
+              <a:tr h="370840">
+                <a:tc>
+                  <a:txBody>
+                    <a:bodyPr/>
+                    <a:lstStyle/>
+                    <a:p>
+                      <a:r>
+                        <a:rPr lang="en-ZA" dirty="0">
+                          <a:highlight>
+                            <a:srgbClr val="FF0000"/>
+                          </a:highlight>
+                        </a:rPr>
+                        <a:t>Red</a:t>
+                      </a:r>
+                    </a:p>
+                  </a:txBody>
+                  <a:tcPr/>
+                </a:tc>
+                <a:tc>
+                  <a:txBody>
+                    <a:bodyPr/>
+                    <a:lstStyle/>
+                    <a:p>
+                      <a:r>
+                        <a:rPr lang="en-ZA" dirty="0">
+                          <a:highlight>
+                            <a:srgbClr val="FF0000"/>
+                          </a:highlight>
+                        </a:rPr>
+                        <a:t>Not done</a:t>
+                      </a:r>
+                    </a:p>
+                  </a:txBody>
+                  <a:tcPr/>
+                </a:tc>
+                <a:extLst>
+                  <a:ext uri="{0D108BD9-81ED-4DB2-BD59-A6C34878D82A}">
+                    <a16:rowId xmlns:a16="http://schemas.microsoft.com/office/drawing/2014/main" val="1409847497"/>
+                  </a:ext>
+                </a:extLst>
+              </a:tr>
+            </a:tbl>
+          </a:graphicData>
+        </a:graphic>
+      </p:graphicFrame>
+      <p:sp>
+        <p:nvSpPr>
+          <p:cNvPr id="5" name="Rectangle 4">
+            <a:extLst>
+              <a:ext uri="{FF2B5EF4-FFF2-40B4-BE49-F238E27FC236}">
+                <a16:creationId xmlns:a16="http://schemas.microsoft.com/office/drawing/2014/main" id="{6FB5C6DD-3D44-4E63-A82E-DC3A5027B35F}"/>
+              </a:ext>
+            </a:extLst>
+          </p:cNvPr>
+          <p:cNvSpPr/>
+          <p:nvPr/>
+        </p:nvSpPr>
+        <p:spPr>
+          <a:xfrm>
+            <a:off x="5019420" y="1675063"/>
+            <a:ext cx="2153154" cy="707886"/>
+          </a:xfrm>
+          <a:prstGeom prst="rect">
+            <a:avLst/>
+          </a:prstGeom>
+          <a:noFill/>
+        </p:spPr>
+        <p:txBody>
+          <a:bodyPr wrap="none" lIns="91440" tIns="45720" rIns="91440" bIns="45720">
+            <a:spAutoFit/>
+          </a:bodyPr>
+          <a:lstStyle/>
+          <a:p>
+            <a:pPr algn="ctr"/>
+            <a:r>
+              <a:rPr lang="en-US" sz="4000" b="1" spc="50" dirty="0">
+                <a:ln w="9525" cmpd="sng">
+                  <a:solidFill>
+                    <a:schemeClr val="accent1"/>
+                  </a:solidFill>
+                  <a:prstDash val="solid"/>
+                </a:ln>
+                <a:solidFill>
+                  <a:srgbClr val="70AD47">
+                    <a:tint val="1000"/>
+                  </a:srgbClr>
+                </a:solidFill>
+                <a:effectLst>
+                  <a:glow rad="38100">
+                    <a:schemeClr val="accent1">
+                      <a:alpha val="40000"/>
+                    </a:schemeClr>
+                  </a:glow>
+                </a:effectLst>
+              </a:rPr>
+              <a:t>LEGEND</a:t>
             </a:r>
           </a:p>
         </p:txBody>
@@ -7013,41 +9770,6 @@
       </p:grpSpPr>
       <p:sp>
         <p:nvSpPr>
-          <p:cNvPr id="2" name="TextBox 1">
-            <a:extLst>
-              <a:ext uri="{FF2B5EF4-FFF2-40B4-BE49-F238E27FC236}">
-                <a16:creationId xmlns:a16="http://schemas.microsoft.com/office/drawing/2014/main" id="{4A21FF7E-995B-4F3D-AD25-818599973C5F}"/>
-              </a:ext>
-            </a:extLst>
-          </p:cNvPr>
-          <p:cNvSpPr txBox="1"/>
-          <p:nvPr/>
-        </p:nvSpPr>
-        <p:spPr>
-          <a:xfrm>
-            <a:off x="4704521" y="92765"/>
-            <a:ext cx="2143215" cy="369332"/>
-          </a:xfrm>
-          <a:prstGeom prst="rect">
-            <a:avLst/>
-          </a:prstGeom>
-          <a:noFill/>
-        </p:spPr>
-        <p:txBody>
-          <a:bodyPr wrap="none" rtlCol="0">
-            <a:spAutoFit/>
-          </a:bodyPr>
-          <a:lstStyle/>
-          <a:p>
-            <a:r>
-              <a:rPr lang="en-ZA" dirty="0"/>
-              <a:t>Use cases + pie chart</a:t>
-            </a:r>
-          </a:p>
-        </p:txBody>
-      </p:sp>
-      <p:sp>
-        <p:nvSpPr>
           <p:cNvPr id="4" name="Rectangle 3">
             <a:extLst>
               <a:ext uri="{FF2B5EF4-FFF2-40B4-BE49-F238E27FC236}">
@@ -7060,7 +9782,7 @@
         </p:nvSpPr>
         <p:spPr>
           <a:xfrm>
-            <a:off x="188686" y="1074509"/>
+            <a:off x="0" y="1299796"/>
             <a:ext cx="6096000" cy="4893647"/>
           </a:xfrm>
           <a:prstGeom prst="rect">
@@ -7283,7 +10005,7 @@
         </p:nvSpPr>
         <p:spPr>
           <a:xfrm>
-            <a:off x="6096000" y="1074509"/>
+            <a:off x="6096000" y="1299796"/>
             <a:ext cx="6096000" cy="4708981"/>
           </a:xfrm>
           <a:prstGeom prst="rect">
@@ -7471,6 +10193,67 @@
               </a:rPr>
               <a:t>. Generate statements/reports (Actor: Admin, System: Data Storage and Organisation) </a:t>
             </a:r>
+          </a:p>
+        </p:txBody>
+      </p:sp>
+      <p:sp>
+        <p:nvSpPr>
+          <p:cNvPr id="6" name="Rectangle 5">
+            <a:extLst>
+              <a:ext uri="{FF2B5EF4-FFF2-40B4-BE49-F238E27FC236}">
+                <a16:creationId xmlns:a16="http://schemas.microsoft.com/office/drawing/2014/main" id="{7A962DCA-21BE-4C70-AFE5-715A43B0FBB7}"/>
+              </a:ext>
+            </a:extLst>
+          </p:cNvPr>
+          <p:cNvSpPr/>
+          <p:nvPr/>
+        </p:nvSpPr>
+        <p:spPr>
+          <a:xfrm>
+            <a:off x="4338050" y="79512"/>
+            <a:ext cx="3515899" cy="923330"/>
+          </a:xfrm>
+          <a:prstGeom prst="rect">
+            <a:avLst/>
+          </a:prstGeom>
+          <a:noFill/>
+        </p:spPr>
+        <p:txBody>
+          <a:bodyPr wrap="none" lIns="91440" tIns="45720" rIns="91440" bIns="45720">
+            <a:spAutoFit/>
+          </a:bodyPr>
+          <a:lstStyle/>
+          <a:p>
+            <a:pPr algn="ctr"/>
+            <a:r>
+              <a:rPr lang="en-US" sz="5400" dirty="0">
+                <a:ln w="0"/>
+                <a:solidFill>
+                  <a:schemeClr val="accent1"/>
+                </a:solidFill>
+                <a:effectLst>
+                  <a:outerShdw blurRad="38100" dist="25400" dir="5400000" algn="ctr" rotWithShape="0">
+                    <a:srgbClr val="6E747A">
+                      <a:alpha val="43000"/>
+                    </a:srgbClr>
+                  </a:outerShdw>
+                </a:effectLst>
+              </a:rPr>
+              <a:t>USE CASES</a:t>
+            </a:r>
+            <a:endParaRPr lang="en-US" sz="5400" b="0" cap="none" spc="0" dirty="0">
+              <a:ln w="0"/>
+              <a:solidFill>
+                <a:schemeClr val="accent1"/>
+              </a:solidFill>
+              <a:effectLst>
+                <a:outerShdw blurRad="38100" dist="25400" dir="5400000" algn="ctr" rotWithShape="0">
+                  <a:srgbClr val="6E747A">
+                    <a:alpha val="43000"/>
+                  </a:srgbClr>
+                </a:outerShdw>
+              </a:effectLst>
+            </a:endParaRPr>
           </a:p>
         </p:txBody>
       </p:sp>
@@ -7518,8 +10301,8 @@
         </p:nvSpPr>
         <p:spPr>
           <a:xfrm>
-            <a:off x="380527" y="1536174"/>
-            <a:ext cx="3498574" cy="3785652"/>
+            <a:off x="132520" y="1241379"/>
+            <a:ext cx="3750364" cy="3508653"/>
           </a:xfrm>
           <a:prstGeom prst="rect">
             <a:avLst/>
@@ -7649,7 +10432,7 @@
         </p:nvSpPr>
         <p:spPr>
           <a:xfrm>
-            <a:off x="4456832" y="0"/>
+            <a:off x="4488299" y="1241379"/>
             <a:ext cx="3498574" cy="3231654"/>
           </a:xfrm>
           <a:prstGeom prst="rect">
@@ -7812,8 +10595,8 @@
         </p:nvSpPr>
         <p:spPr>
           <a:xfrm>
-            <a:off x="8693426" y="0"/>
-            <a:ext cx="3498574" cy="6001643"/>
+            <a:off x="8335619" y="1174406"/>
+            <a:ext cx="3750365" cy="5447645"/>
           </a:xfrm>
           <a:prstGeom prst="rect">
             <a:avLst/>
@@ -7950,6 +10733,67 @@
               <a:t>. Generate a Statement/Report of a Link-Wallet user (Actor: Company Representative, System: Smart Payment) </a:t>
             </a:r>
             <a:endParaRPr lang="en-ZA" dirty="0"/>
+          </a:p>
+        </p:txBody>
+      </p:sp>
+      <p:sp>
+        <p:nvSpPr>
+          <p:cNvPr id="6" name="Rectangle 5">
+            <a:extLst>
+              <a:ext uri="{FF2B5EF4-FFF2-40B4-BE49-F238E27FC236}">
+                <a16:creationId xmlns:a16="http://schemas.microsoft.com/office/drawing/2014/main" id="{5E98E2E2-2853-47FD-AC70-811A6445B5EF}"/>
+              </a:ext>
+            </a:extLst>
+          </p:cNvPr>
+          <p:cNvSpPr/>
+          <p:nvPr/>
+        </p:nvSpPr>
+        <p:spPr>
+          <a:xfrm>
+            <a:off x="4338050" y="92764"/>
+            <a:ext cx="3515899" cy="923330"/>
+          </a:xfrm>
+          <a:prstGeom prst="rect">
+            <a:avLst/>
+          </a:prstGeom>
+          <a:noFill/>
+        </p:spPr>
+        <p:txBody>
+          <a:bodyPr wrap="none" lIns="91440" tIns="45720" rIns="91440" bIns="45720">
+            <a:spAutoFit/>
+          </a:bodyPr>
+          <a:lstStyle/>
+          <a:p>
+            <a:pPr algn="ctr"/>
+            <a:r>
+              <a:rPr lang="en-US" sz="5400" dirty="0">
+                <a:ln w="0"/>
+                <a:solidFill>
+                  <a:schemeClr val="accent1"/>
+                </a:solidFill>
+                <a:effectLst>
+                  <a:outerShdw blurRad="38100" dist="25400" dir="5400000" algn="ctr" rotWithShape="0">
+                    <a:srgbClr val="6E747A">
+                      <a:alpha val="43000"/>
+                    </a:srgbClr>
+                  </a:outerShdw>
+                </a:effectLst>
+              </a:rPr>
+              <a:t>USE CASES</a:t>
+            </a:r>
+            <a:endParaRPr lang="en-US" sz="5400" b="0" cap="none" spc="0" dirty="0">
+              <a:ln w="0"/>
+              <a:solidFill>
+                <a:schemeClr val="accent1"/>
+              </a:solidFill>
+              <a:effectLst>
+                <a:outerShdw blurRad="38100" dist="25400" dir="5400000" algn="ctr" rotWithShape="0">
+                  <a:srgbClr val="6E747A">
+                    <a:alpha val="43000"/>
+                  </a:srgbClr>
+                </a:outerShdw>
+              </a:effectLst>
+            </a:endParaRPr>
           </a:p>
         </p:txBody>
       </p:sp>
@@ -7985,10 +10829,319 @@
       </p:grpSpPr>
       <p:sp>
         <p:nvSpPr>
-          <p:cNvPr id="2" name="TextBox 1">
+          <p:cNvPr id="3" name="Rectangle 2">
             <a:extLst>
               <a:ext uri="{FF2B5EF4-FFF2-40B4-BE49-F238E27FC236}">
-                <a16:creationId xmlns:a16="http://schemas.microsoft.com/office/drawing/2014/main" id="{1681F40E-5BAB-451F-BBA6-81E900AA8737}"/>
+                <a16:creationId xmlns:a16="http://schemas.microsoft.com/office/drawing/2014/main" id="{A95A8BEE-5605-40B4-8457-A1A3E23A8281}"/>
+              </a:ext>
+            </a:extLst>
+          </p:cNvPr>
+          <p:cNvSpPr/>
+          <p:nvPr/>
+        </p:nvSpPr>
+        <p:spPr>
+          <a:xfrm>
+            <a:off x="4338050" y="79512"/>
+            <a:ext cx="3515899" cy="923330"/>
+          </a:xfrm>
+          <a:prstGeom prst="rect">
+            <a:avLst/>
+          </a:prstGeom>
+          <a:noFill/>
+        </p:spPr>
+        <p:txBody>
+          <a:bodyPr wrap="none" lIns="91440" tIns="45720" rIns="91440" bIns="45720">
+            <a:spAutoFit/>
+          </a:bodyPr>
+          <a:lstStyle/>
+          <a:p>
+            <a:pPr algn="ctr"/>
+            <a:r>
+              <a:rPr lang="en-US" sz="5400" dirty="0">
+                <a:ln w="0"/>
+                <a:solidFill>
+                  <a:schemeClr val="accent1"/>
+                </a:solidFill>
+                <a:effectLst>
+                  <a:outerShdw blurRad="38100" dist="25400" dir="5400000" algn="ctr" rotWithShape="0">
+                    <a:srgbClr val="6E747A">
+                      <a:alpha val="43000"/>
+                    </a:srgbClr>
+                  </a:outerShdw>
+                </a:effectLst>
+              </a:rPr>
+              <a:t>USE CASES</a:t>
+            </a:r>
+            <a:endParaRPr lang="en-US" sz="5400" b="0" cap="none" spc="0" dirty="0">
+              <a:ln w="0"/>
+              <a:solidFill>
+                <a:schemeClr val="accent1"/>
+              </a:solidFill>
+              <a:effectLst>
+                <a:outerShdw blurRad="38100" dist="25400" dir="5400000" algn="ctr" rotWithShape="0">
+                  <a:srgbClr val="6E747A">
+                    <a:alpha val="43000"/>
+                  </a:srgbClr>
+                </a:outerShdw>
+              </a:effectLst>
+            </a:endParaRPr>
+          </a:p>
+        </p:txBody>
+      </p:sp>
+      <p:sp>
+        <p:nvSpPr>
+          <p:cNvPr id="7" name="Rectangle 6">
+            <a:extLst>
+              <a:ext uri="{FF2B5EF4-FFF2-40B4-BE49-F238E27FC236}">
+                <a16:creationId xmlns:a16="http://schemas.microsoft.com/office/drawing/2014/main" id="{07AA5D72-62C1-4737-9353-058618771AA2}"/>
+              </a:ext>
+            </a:extLst>
+          </p:cNvPr>
+          <p:cNvSpPr/>
+          <p:nvPr/>
+        </p:nvSpPr>
+        <p:spPr>
+          <a:xfrm>
+            <a:off x="4626655" y="988045"/>
+            <a:ext cx="2938690" cy="707886"/>
+          </a:xfrm>
+          <a:prstGeom prst="rect">
+            <a:avLst/>
+          </a:prstGeom>
+          <a:noFill/>
+        </p:spPr>
+        <p:txBody>
+          <a:bodyPr wrap="none" lIns="91440" tIns="45720" rIns="91440" bIns="45720">
+            <a:spAutoFit/>
+          </a:bodyPr>
+          <a:lstStyle/>
+          <a:p>
+            <a:pPr algn="ctr"/>
+            <a:r>
+              <a:rPr lang="en-US" sz="4000" b="1" spc="50" dirty="0">
+                <a:ln w="9525" cmpd="sng">
+                  <a:solidFill>
+                    <a:schemeClr val="accent1"/>
+                  </a:solidFill>
+                  <a:prstDash val="solid"/>
+                </a:ln>
+                <a:solidFill>
+                  <a:srgbClr val="70AD47">
+                    <a:tint val="1000"/>
+                  </a:srgbClr>
+                </a:solidFill>
+                <a:effectLst>
+                  <a:glow rad="38100">
+                    <a:schemeClr val="accent1">
+                      <a:alpha val="40000"/>
+                    </a:schemeClr>
+                  </a:glow>
+                </a:effectLst>
+              </a:rPr>
+              <a:t>PIE  TJAART</a:t>
+            </a:r>
+          </a:p>
+        </p:txBody>
+      </p:sp>
+      <p:grpSp>
+        <p:nvGrpSpPr>
+          <p:cNvPr id="16" name="Group 15">
+            <a:extLst>
+              <a:ext uri="{FF2B5EF4-FFF2-40B4-BE49-F238E27FC236}">
+                <a16:creationId xmlns:a16="http://schemas.microsoft.com/office/drawing/2014/main" id="{018DA84E-6894-486B-A49A-ADAF2352CBA6}"/>
+              </a:ext>
+            </a:extLst>
+          </p:cNvPr>
+          <p:cNvGrpSpPr/>
+          <p:nvPr/>
+        </p:nvGrpSpPr>
+        <p:grpSpPr>
+          <a:xfrm>
+            <a:off x="3753690" y="1931811"/>
+            <a:ext cx="4684617" cy="4684617"/>
+            <a:chOff x="4936434" y="2367911"/>
+            <a:chExt cx="2319130" cy="2319130"/>
+          </a:xfrm>
+        </p:grpSpPr>
+        <p:sp>
+          <p:nvSpPr>
+            <p:cNvPr id="5" name="Oval 4">
+              <a:extLst>
+                <a:ext uri="{FF2B5EF4-FFF2-40B4-BE49-F238E27FC236}">
+                  <a16:creationId xmlns:a16="http://schemas.microsoft.com/office/drawing/2014/main" id="{6C079820-E9E7-4ADB-8AD7-BEF07E027787}"/>
+                </a:ext>
+              </a:extLst>
+            </p:cNvPr>
+            <p:cNvSpPr/>
+            <p:nvPr/>
+          </p:nvSpPr>
+          <p:spPr>
+            <a:xfrm>
+              <a:off x="4936434" y="2367911"/>
+              <a:ext cx="2319130" cy="2319130"/>
+            </a:xfrm>
+            <a:prstGeom prst="ellipse">
+              <a:avLst/>
+            </a:prstGeom>
+            <a:blipFill>
+              <a:blip r:embed="rId2"/>
+              <a:stretch>
+                <a:fillRect/>
+              </a:stretch>
+            </a:blipFill>
+          </p:spPr>
+          <p:style>
+            <a:lnRef idx="2">
+              <a:schemeClr val="accent1">
+                <a:shade val="50000"/>
+              </a:schemeClr>
+            </a:lnRef>
+            <a:fillRef idx="1">
+              <a:schemeClr val="accent1"/>
+            </a:fillRef>
+            <a:effectRef idx="0">
+              <a:schemeClr val="accent1"/>
+            </a:effectRef>
+            <a:fontRef idx="minor">
+              <a:schemeClr val="lt1"/>
+            </a:fontRef>
+          </p:style>
+          <p:txBody>
+            <a:bodyPr rtlCol="0" anchor="ctr"/>
+            <a:lstStyle/>
+            <a:p>
+              <a:pPr algn="ctr"/>
+              <a:endParaRPr lang="en-ZA"/>
+            </a:p>
+          </p:txBody>
+        </p:sp>
+        <p:cxnSp>
+          <p:nvCxnSpPr>
+            <p:cNvPr id="8" name="Straight Connector 7">
+              <a:extLst>
+                <a:ext uri="{FF2B5EF4-FFF2-40B4-BE49-F238E27FC236}">
+                  <a16:creationId xmlns:a16="http://schemas.microsoft.com/office/drawing/2014/main" id="{1C52FB43-2561-486F-BB86-023A01259127}"/>
+                </a:ext>
+              </a:extLst>
+            </p:cNvPr>
+            <p:cNvCxnSpPr>
+              <a:cxnSpLocks/>
+              <a:endCxn id="5" idx="0"/>
+            </p:cNvCxnSpPr>
+            <p:nvPr/>
+          </p:nvCxnSpPr>
+          <p:spPr>
+            <a:xfrm flipV="1">
+              <a:off x="6095999" y="2367911"/>
+              <a:ext cx="0" cy="1159565"/>
+            </a:xfrm>
+            <a:prstGeom prst="line">
+              <a:avLst/>
+            </a:prstGeom>
+            <a:ln w="38100"/>
+          </p:spPr>
+          <p:style>
+            <a:lnRef idx="1">
+              <a:schemeClr val="accent1"/>
+            </a:lnRef>
+            <a:fillRef idx="0">
+              <a:schemeClr val="accent1"/>
+            </a:fillRef>
+            <a:effectRef idx="0">
+              <a:schemeClr val="accent1"/>
+            </a:effectRef>
+            <a:fontRef idx="minor">
+              <a:schemeClr val="tx1"/>
+            </a:fontRef>
+          </p:style>
+        </p:cxnSp>
+        <p:cxnSp>
+          <p:nvCxnSpPr>
+            <p:cNvPr id="10" name="Straight Connector 9">
+              <a:extLst>
+                <a:ext uri="{FF2B5EF4-FFF2-40B4-BE49-F238E27FC236}">
+                  <a16:creationId xmlns:a16="http://schemas.microsoft.com/office/drawing/2014/main" id="{01C84C33-E9EC-4EBA-AEF9-F3A6D5794529}"/>
+                </a:ext>
+              </a:extLst>
+            </p:cNvPr>
+            <p:cNvCxnSpPr>
+              <a:cxnSpLocks/>
+              <a:endCxn id="5" idx="5"/>
+            </p:cNvCxnSpPr>
+            <p:nvPr/>
+          </p:nvCxnSpPr>
+          <p:spPr>
+            <a:xfrm>
+              <a:off x="6095999" y="3527476"/>
+              <a:ext cx="819936" cy="819936"/>
+            </a:xfrm>
+            <a:prstGeom prst="line">
+              <a:avLst/>
+            </a:prstGeom>
+            <a:ln w="38100"/>
+          </p:spPr>
+          <p:style>
+            <a:lnRef idx="1">
+              <a:schemeClr val="accent1"/>
+            </a:lnRef>
+            <a:fillRef idx="0">
+              <a:schemeClr val="accent1"/>
+            </a:fillRef>
+            <a:effectRef idx="0">
+              <a:schemeClr val="accent1"/>
+            </a:effectRef>
+            <a:fontRef idx="minor">
+              <a:schemeClr val="tx1"/>
+            </a:fontRef>
+          </p:style>
+        </p:cxnSp>
+        <p:cxnSp>
+          <p:nvCxnSpPr>
+            <p:cNvPr id="12" name="Straight Connector 11">
+              <a:extLst>
+                <a:ext uri="{FF2B5EF4-FFF2-40B4-BE49-F238E27FC236}">
+                  <a16:creationId xmlns:a16="http://schemas.microsoft.com/office/drawing/2014/main" id="{18A2662C-DBCA-4D41-BE7B-E5362FB57913}"/>
+                </a:ext>
+              </a:extLst>
+            </p:cNvPr>
+            <p:cNvCxnSpPr>
+              <a:cxnSpLocks/>
+              <a:endCxn id="5" idx="4"/>
+            </p:cNvCxnSpPr>
+            <p:nvPr/>
+          </p:nvCxnSpPr>
+          <p:spPr>
+            <a:xfrm>
+              <a:off x="6095999" y="3527476"/>
+              <a:ext cx="0" cy="1159565"/>
+            </a:xfrm>
+            <a:prstGeom prst="line">
+              <a:avLst/>
+            </a:prstGeom>
+            <a:ln w="38100"/>
+          </p:spPr>
+          <p:style>
+            <a:lnRef idx="1">
+              <a:schemeClr val="accent1"/>
+            </a:lnRef>
+            <a:fillRef idx="0">
+              <a:schemeClr val="accent1"/>
+            </a:fillRef>
+            <a:effectRef idx="0">
+              <a:schemeClr val="accent1"/>
+            </a:effectRef>
+            <a:fontRef idx="minor">
+              <a:schemeClr val="tx1"/>
+            </a:fontRef>
+          </p:style>
+        </p:cxnSp>
+      </p:grpSp>
+      <p:sp>
+        <p:nvSpPr>
+          <p:cNvPr id="17" name="TextBox 16">
+            <a:extLst>
+              <a:ext uri="{FF2B5EF4-FFF2-40B4-BE49-F238E27FC236}">
+                <a16:creationId xmlns:a16="http://schemas.microsoft.com/office/drawing/2014/main" id="{B6329E38-2C8F-4CED-BCB0-CF9817DE353C}"/>
               </a:ext>
             </a:extLst>
           </p:cNvPr>
@@ -7997,8 +11150,8 @@
         </p:nvSpPr>
         <p:spPr>
           <a:xfrm>
-            <a:off x="5327374" y="1630017"/>
-            <a:ext cx="1069524" cy="369332"/>
+            <a:off x="8135839" y="2504050"/>
+            <a:ext cx="753732" cy="369332"/>
           </a:xfrm>
           <a:prstGeom prst="rect">
             <a:avLst/>
@@ -8012,9 +11165,77 @@
           <a:lstStyle/>
           <a:p>
             <a:r>
-              <a:rPr lang="en-ZA" dirty="0"/>
-              <a:t>Pie </a:t>
-            </a:r>
+              <a:rPr lang="en-ZA" dirty="0" err="1"/>
+              <a:t>Tjaart</a:t>
+            </a:r>
+            <a:endParaRPr lang="en-ZA" dirty="0"/>
+          </a:p>
+        </p:txBody>
+      </p:sp>
+      <p:sp>
+        <p:nvSpPr>
+          <p:cNvPr id="19" name="TextBox 18">
+            <a:extLst>
+              <a:ext uri="{FF2B5EF4-FFF2-40B4-BE49-F238E27FC236}">
+                <a16:creationId xmlns:a16="http://schemas.microsoft.com/office/drawing/2014/main" id="{7F69AB3C-5A5D-4763-A581-3E259A4C4B94}"/>
+              </a:ext>
+            </a:extLst>
+          </p:cNvPr>
+          <p:cNvSpPr txBox="1"/>
+          <p:nvPr/>
+        </p:nvSpPr>
+        <p:spPr>
+          <a:xfrm>
+            <a:off x="7565345" y="6230605"/>
+            <a:ext cx="978153" cy="369332"/>
+          </a:xfrm>
+          <a:prstGeom prst="rect">
+            <a:avLst/>
+          </a:prstGeom>
+          <a:noFill/>
+        </p:spPr>
+        <p:txBody>
+          <a:bodyPr wrap="none" rtlCol="0">
+            <a:spAutoFit/>
+          </a:bodyPr>
+          <a:lstStyle/>
+          <a:p>
+            <a:r>
+              <a:rPr lang="en-ZA" dirty="0" err="1"/>
+              <a:t>Tjaartjie</a:t>
+            </a:r>
+            <a:endParaRPr lang="en-ZA" dirty="0"/>
+          </a:p>
+        </p:txBody>
+      </p:sp>
+      <p:sp>
+        <p:nvSpPr>
+          <p:cNvPr id="20" name="TextBox 19">
+            <a:extLst>
+              <a:ext uri="{FF2B5EF4-FFF2-40B4-BE49-F238E27FC236}">
+                <a16:creationId xmlns:a16="http://schemas.microsoft.com/office/drawing/2014/main" id="{8452F638-C66E-48F2-9752-4907B7BFAC35}"/>
+              </a:ext>
+            </a:extLst>
+          </p:cNvPr>
+          <p:cNvSpPr txBox="1"/>
+          <p:nvPr/>
+        </p:nvSpPr>
+        <p:spPr>
+          <a:xfrm>
+            <a:off x="2999958" y="2918299"/>
+            <a:ext cx="753732" cy="369332"/>
+          </a:xfrm>
+          <a:prstGeom prst="rect">
+            <a:avLst/>
+          </a:prstGeom>
+          <a:noFill/>
+        </p:spPr>
+        <p:txBody>
+          <a:bodyPr wrap="none" rtlCol="0">
+            <a:spAutoFit/>
+          </a:bodyPr>
+          <a:lstStyle/>
+          <a:p>
             <a:r>
               <a:rPr lang="en-ZA" dirty="0" err="1"/>
               <a:t>Tjaart</a:t>
@@ -8067,7 +11288,7 @@
         </p:nvGrpSpPr>
         <p:grpSpPr>
           <a:xfrm>
-            <a:off x="2537492" y="1400685"/>
+            <a:off x="2312205" y="1930774"/>
             <a:ext cx="6197552" cy="4555970"/>
             <a:chOff x="0" y="0"/>
             <a:chExt cx="8263402" cy="6074627"/>
@@ -8475,47 +11696,116 @@
       </p:grpSp>
       <p:sp>
         <p:nvSpPr>
-          <p:cNvPr id="14" name="TextBox 13">
+          <p:cNvPr id="15" name="Rectangle 14">
             <a:extLst>
               <a:ext uri="{FF2B5EF4-FFF2-40B4-BE49-F238E27FC236}">
-                <a16:creationId xmlns:a16="http://schemas.microsoft.com/office/drawing/2014/main" id="{6C3E2DE5-A006-4099-972E-B388D4770D6F}"/>
+                <a16:creationId xmlns:a16="http://schemas.microsoft.com/office/drawing/2014/main" id="{401E6A1E-3AD7-4967-BD07-FC58ED24E57C}"/>
               </a:ext>
             </a:extLst>
           </p:cNvPr>
-          <p:cNvSpPr txBox="1"/>
+          <p:cNvSpPr/>
           <p:nvPr/>
         </p:nvSpPr>
         <p:spPr>
           <a:xfrm>
-            <a:off x="2187507" y="374695"/>
-            <a:ext cx="8658816" cy="356235"/>
+            <a:off x="4338050" y="79606"/>
+            <a:ext cx="3515899" cy="923330"/>
           </a:xfrm>
           <a:prstGeom prst="rect">
             <a:avLst/>
           </a:prstGeom>
+          <a:noFill/>
         </p:spPr>
         <p:txBody>
-          <a:bodyPr lIns="0" tIns="0" rIns="0" bIns="0" rtlCol="0" anchor="t">
+          <a:bodyPr wrap="none" lIns="91440" tIns="45720" rIns="91440" bIns="45720">
             <a:spAutoFit/>
           </a:bodyPr>
           <a:lstStyle/>
           <a:p>
-            <a:pPr algn="ctr">
-              <a:lnSpc>
-                <a:spcPts val="2940"/>
-              </a:lnSpc>
-              <a:spcBef>
-                <a:spcPct val="0"/>
-              </a:spcBef>
-            </a:pPr>
-            <a:r>
-              <a:rPr lang="en-US" sz="2100">
-                <a:solidFill>
-                  <a:srgbClr val="000000"/>
-                </a:solidFill>
-                <a:latin typeface="Montserrat"/>
+            <a:pPr algn="ctr"/>
+            <a:r>
+              <a:rPr lang="en-US" sz="5400" dirty="0">
+                <a:ln w="0"/>
+                <a:solidFill>
+                  <a:schemeClr val="accent1"/>
+                </a:solidFill>
+                <a:effectLst>
+                  <a:outerShdw blurRad="38100" dist="25400" dir="5400000" algn="ctr" rotWithShape="0">
+                    <a:srgbClr val="6E747A">
+                      <a:alpha val="43000"/>
+                    </a:srgbClr>
+                  </a:outerShdw>
+                </a:effectLst>
               </a:rPr>
-              <a:t>Progress</a:t>
+              <a:t>USE CASES</a:t>
+            </a:r>
+            <a:endParaRPr lang="en-US" sz="5400" b="0" cap="none" spc="0" dirty="0">
+              <a:ln w="0"/>
+              <a:solidFill>
+                <a:schemeClr val="accent1"/>
+              </a:solidFill>
+              <a:effectLst>
+                <a:outerShdw blurRad="38100" dist="25400" dir="5400000" algn="ctr" rotWithShape="0">
+                  <a:srgbClr val="6E747A">
+                    <a:alpha val="43000"/>
+                  </a:srgbClr>
+                </a:outerShdw>
+              </a:effectLst>
+            </a:endParaRPr>
+          </a:p>
+        </p:txBody>
+      </p:sp>
+      <p:sp>
+        <p:nvSpPr>
+          <p:cNvPr id="16" name="Rectangle 15">
+            <a:extLst>
+              <a:ext uri="{FF2B5EF4-FFF2-40B4-BE49-F238E27FC236}">
+                <a16:creationId xmlns:a16="http://schemas.microsoft.com/office/drawing/2014/main" id="{B077C52C-2039-4F06-8707-DDBCCDBF7B14}"/>
+              </a:ext>
+            </a:extLst>
+          </p:cNvPr>
+          <p:cNvSpPr/>
+          <p:nvPr/>
+        </p:nvSpPr>
+        <p:spPr>
+          <a:xfrm>
+            <a:off x="4698821" y="1067690"/>
+            <a:ext cx="2794356" cy="707886"/>
+          </a:xfrm>
+          <a:prstGeom prst="rect">
+            <a:avLst/>
+          </a:prstGeom>
+          <a:noFill/>
+        </p:spPr>
+        <p:txBody>
+          <a:bodyPr wrap="none" lIns="91440" tIns="45720" rIns="91440" bIns="45720">
+            <a:spAutoFit/>
+          </a:bodyPr>
+          <a:lstStyle/>
+          <a:p>
+            <a:pPr algn="ctr"/>
+            <a:r>
+              <a:rPr lang="en-US" sz="4000" b="1" spc="50" dirty="0">
+                <a:ln w="9525" cmpd="sng">
+                  <a:solidFill>
+                    <a:schemeClr val="accent1"/>
+                  </a:solidFill>
+                  <a:prstDash val="solid"/>
+                </a:ln>
+                <a:solidFill>
+                  <a:srgbClr val="70AD47">
+                    <a:tint val="1000"/>
+                  </a:srgbClr>
+                </a:solidFill>
+                <a:effectLst>
+                  <a:glow rad="38100">
+                    <a:schemeClr val="accent1">
+                      <a:alpha val="40000"/>
+                    </a:schemeClr>
+                  </a:glow>
+                </a:effectLst>
+              </a:rPr>
+              <a:t>PROGRESS</a:t>
             </a:r>
           </a:p>
         </p:txBody>
@@ -8550,42 +11840,6 @@
           <a:chExt cx="0" cy="0"/>
         </a:xfrm>
       </p:grpSpPr>
-      <p:sp>
-        <p:nvSpPr>
-          <p:cNvPr id="2" name="TextBox 1">
-            <a:extLst>
-              <a:ext uri="{FF2B5EF4-FFF2-40B4-BE49-F238E27FC236}">
-                <a16:creationId xmlns:a16="http://schemas.microsoft.com/office/drawing/2014/main" id="{F68F073D-5154-4B54-9BF3-139374620254}"/>
-              </a:ext>
-            </a:extLst>
-          </p:cNvPr>
-          <p:cNvSpPr txBox="1"/>
-          <p:nvPr/>
-        </p:nvSpPr>
-        <p:spPr>
-          <a:xfrm>
-            <a:off x="4776023" y="159026"/>
-            <a:ext cx="2639953" cy="369332"/>
-          </a:xfrm>
-          <a:prstGeom prst="rect">
-            <a:avLst/>
-          </a:prstGeom>
-          <a:noFill/>
-        </p:spPr>
-        <p:txBody>
-          <a:bodyPr wrap="none" rtlCol="0">
-            <a:spAutoFit/>
-          </a:bodyPr>
-          <a:lstStyle/>
-          <a:p>
-            <a:r>
-              <a:rPr lang="en-ZA"/>
-              <a:t>Unit AND integration tests</a:t>
-            </a:r>
-            <a:endParaRPr lang="en-ZA" dirty="0"/>
-          </a:p>
-        </p:txBody>
-      </p:sp>
       <p:pic>
         <p:nvPicPr>
           <p:cNvPr id="13" name="Picture 6" descr="http://www.clker.com/cliparts/1/j/O/f/m/m/server-rack-cabinet-md.png">
@@ -8633,6 +11887,128 @@
           </a:extLst>
         </p:spPr>
       </p:pic>
+      <p:sp>
+        <p:nvSpPr>
+          <p:cNvPr id="5" name="Rectangle 4">
+            <a:extLst>
+              <a:ext uri="{FF2B5EF4-FFF2-40B4-BE49-F238E27FC236}">
+                <a16:creationId xmlns:a16="http://schemas.microsoft.com/office/drawing/2014/main" id="{396C8AA2-4C73-417D-B45F-28FC753183CE}"/>
+              </a:ext>
+            </a:extLst>
+          </p:cNvPr>
+          <p:cNvSpPr/>
+          <p:nvPr/>
+        </p:nvSpPr>
+        <p:spPr>
+          <a:xfrm>
+            <a:off x="1836473" y="172370"/>
+            <a:ext cx="8519062" cy="830997"/>
+          </a:xfrm>
+          <a:prstGeom prst="rect">
+            <a:avLst/>
+          </a:prstGeom>
+          <a:noFill/>
+        </p:spPr>
+        <p:txBody>
+          <a:bodyPr wrap="none" lIns="91440" tIns="45720" rIns="91440" bIns="45720">
+            <a:spAutoFit/>
+          </a:bodyPr>
+          <a:lstStyle/>
+          <a:p>
+            <a:pPr algn="ctr"/>
+            <a:r>
+              <a:rPr lang="en-US" sz="4800" dirty="0">
+                <a:ln w="0"/>
+                <a:solidFill>
+                  <a:schemeClr val="accent1"/>
+                </a:solidFill>
+                <a:effectLst>
+                  <a:outerShdw blurRad="38100" dist="25400" dir="5400000" algn="ctr" rotWithShape="0">
+                    <a:srgbClr val="6E747A">
+                      <a:alpha val="43000"/>
+                    </a:srgbClr>
+                  </a:outerShdw>
+                </a:effectLst>
+              </a:rPr>
+              <a:t>UNIT AND INTEGRATION TESTS</a:t>
+            </a:r>
+            <a:endParaRPr lang="en-US" sz="4800" b="0" cap="none" spc="0" dirty="0">
+              <a:ln w="0"/>
+              <a:solidFill>
+                <a:schemeClr val="accent1"/>
+              </a:solidFill>
+              <a:effectLst>
+                <a:outerShdw blurRad="38100" dist="25400" dir="5400000" algn="ctr" rotWithShape="0">
+                  <a:srgbClr val="6E747A">
+                    <a:alpha val="43000"/>
+                  </a:srgbClr>
+                </a:outerShdw>
+              </a:effectLst>
+            </a:endParaRPr>
+          </a:p>
+        </p:txBody>
+      </p:sp>
+      <p:pic>
+        <p:nvPicPr>
+          <p:cNvPr id="2050" name="Picture 2" descr="1200px-Logo_jasmine.svg.png (1200Ã1195)">
+            <a:extLst>
+              <a:ext uri="{FF2B5EF4-FFF2-40B4-BE49-F238E27FC236}">
+                <a16:creationId xmlns:a16="http://schemas.microsoft.com/office/drawing/2014/main" id="{05C8242E-C043-4EEE-BC84-6A5E58171984}"/>
+              </a:ext>
+            </a:extLst>
+          </p:cNvPr>
+          <p:cNvPicPr>
+            <a:picLocks noChangeAspect="1" noChangeArrowheads="1"/>
+          </p:cNvPicPr>
+          <p:nvPr/>
+        </p:nvPicPr>
+        <p:blipFill>
+          <a:blip r:embed="rId3">
+            <a:biLevel thresh="25000"/>
+            <a:extLst>
+              <a:ext uri="{BEBA8EAE-BF5A-486C-A8C5-ECC9F3942E4B}">
+                <a14:imgProps xmlns:a14="http://schemas.microsoft.com/office/drawing/2010/main">
+                  <a14:imgLayer r:embed="rId4">
+                    <a14:imgEffect>
+                      <a14:saturation sat="400000"/>
+                    </a14:imgEffect>
+                  </a14:imgLayer>
+                </a14:imgProps>
+              </a:ext>
+              <a:ext uri="{28A0092B-C50C-407E-A947-70E740481C1C}">
+                <a14:useLocalDpi xmlns:a14="http://schemas.microsoft.com/office/drawing/2010/main" val="0"/>
+              </a:ext>
+            </a:extLst>
+          </a:blip>
+          <a:srcRect/>
+          <a:stretch>
+            <a:fillRect/>
+          </a:stretch>
+        </p:blipFill>
+        <p:spPr bwMode="auto">
+          <a:xfrm>
+            <a:off x="5762621" y="1677961"/>
+            <a:ext cx="876718" cy="873081"/>
+          </a:xfrm>
+          <a:prstGeom prst="rect">
+            <a:avLst/>
+          </a:prstGeom>
+          <a:noFill/>
+          <a:scene3d>
+            <a:camera prst="isometricTopUp"/>
+            <a:lightRig rig="threePt" dir="t"/>
+          </a:scene3d>
+          <a:extLst>
+            <a:ext uri="{909E8E84-426E-40DD-AFC4-6F175D3DCCD1}">
+              <a14:hiddenFill xmlns:a14="http://schemas.microsoft.com/office/drawing/2010/main">
+                <a:solidFill>
+                  <a:srgbClr val="FFFFFF"/>
+                </a:solidFill>
+              </a14:hiddenFill>
+            </a:ext>
+          </a:extLst>
+        </p:spPr>
+      </p:pic>
     </p:spTree>
     <p:extLst>
       <p:ext uri="{BB962C8B-B14F-4D97-AF65-F5344CB8AC3E}">
@@ -8663,41 +12039,6 @@
           <a:chExt cx="0" cy="0"/>
         </a:xfrm>
       </p:grpSpPr>
-      <p:sp>
-        <p:nvSpPr>
-          <p:cNvPr id="2" name="TextBox 1">
-            <a:extLst>
-              <a:ext uri="{FF2B5EF4-FFF2-40B4-BE49-F238E27FC236}">
-                <a16:creationId xmlns:a16="http://schemas.microsoft.com/office/drawing/2014/main" id="{6121EC33-8F4A-4023-B538-8FE2CE6BAB21}"/>
-              </a:ext>
-            </a:extLst>
-          </p:cNvPr>
-          <p:cNvSpPr txBox="1"/>
-          <p:nvPr/>
-        </p:nvSpPr>
-        <p:spPr>
-          <a:xfrm>
-            <a:off x="5049078" y="225286"/>
-            <a:ext cx="2280304" cy="369332"/>
-          </a:xfrm>
-          <a:prstGeom prst="rect">
-            <a:avLst/>
-          </a:prstGeom>
-          <a:noFill/>
-        </p:spPr>
-        <p:txBody>
-          <a:bodyPr wrap="none" rtlCol="0">
-            <a:spAutoFit/>
-          </a:bodyPr>
-          <a:lstStyle/>
-          <a:p>
-            <a:r>
-              <a:rPr lang="en-ZA" dirty="0"/>
-              <a:t>Admin interface demo</a:t>
-            </a:r>
-          </a:p>
-        </p:txBody>
-      </p:sp>
       <p:grpSp>
         <p:nvGrpSpPr>
           <p:cNvPr id="5" name="Group 4">
@@ -8823,6 +12164,67 @@
           </p:spPr>
         </p:pic>
       </p:grpSp>
+      <p:sp>
+        <p:nvSpPr>
+          <p:cNvPr id="7" name="Rectangle 6">
+            <a:extLst>
+              <a:ext uri="{FF2B5EF4-FFF2-40B4-BE49-F238E27FC236}">
+                <a16:creationId xmlns:a16="http://schemas.microsoft.com/office/drawing/2014/main" id="{B6966F69-0363-4CE7-8397-5F14D4801B14}"/>
+              </a:ext>
+            </a:extLst>
+          </p:cNvPr>
+          <p:cNvSpPr/>
+          <p:nvPr/>
+        </p:nvSpPr>
+        <p:spPr>
+          <a:xfrm>
+            <a:off x="2584087" y="172370"/>
+            <a:ext cx="7023846" cy="830997"/>
+          </a:xfrm>
+          <a:prstGeom prst="rect">
+            <a:avLst/>
+          </a:prstGeom>
+          <a:noFill/>
+        </p:spPr>
+        <p:txBody>
+          <a:bodyPr wrap="none" lIns="91440" tIns="45720" rIns="91440" bIns="45720">
+            <a:spAutoFit/>
+          </a:bodyPr>
+          <a:lstStyle/>
+          <a:p>
+            <a:pPr algn="ctr"/>
+            <a:r>
+              <a:rPr lang="en-US" sz="4800" dirty="0">
+                <a:ln w="0"/>
+                <a:solidFill>
+                  <a:schemeClr val="accent1"/>
+                </a:solidFill>
+                <a:effectLst>
+                  <a:outerShdw blurRad="38100" dist="25400" dir="5400000" algn="ctr" rotWithShape="0">
+                    <a:srgbClr val="6E747A">
+                      <a:alpha val="43000"/>
+                    </a:srgbClr>
+                  </a:outerShdw>
+                </a:effectLst>
+              </a:rPr>
+              <a:t>ADMIN INTERFACE DEMO</a:t>
+            </a:r>
+            <a:endParaRPr lang="en-US" sz="4800" b="0" cap="none" spc="0" dirty="0">
+              <a:ln w="0"/>
+              <a:solidFill>
+                <a:schemeClr val="accent1"/>
+              </a:solidFill>
+              <a:effectLst>
+                <a:outerShdw blurRad="38100" dist="25400" dir="5400000" algn="ctr" rotWithShape="0">
+                  <a:srgbClr val="6E747A">
+                    <a:alpha val="43000"/>
+                  </a:srgbClr>
+                </a:outerShdw>
+              </a:effectLst>
+            </a:endParaRPr>
+          </a:p>
+        </p:txBody>
+      </p:sp>
     </p:spTree>
     <p:extLst>
       <p:ext uri="{BB962C8B-B14F-4D97-AF65-F5344CB8AC3E}">

</xml_diff>